<commit_message>
changed the presentation file.
- Added a diagram for the need of the application.
- Added a description for CBT.
</commit_message>
<xml_diff>
--- a/Documents/캡스톤_6조_1주차.pptx
+++ b/Documents/캡스톤_6조_1주차.pptx
@@ -4,18 +4,20 @@
   <p:sldMasterIdLst>
     <p:sldMasterId id="2147483672" r:id="rId1"/>
   </p:sldMasterIdLst>
+  <p:notesMasterIdLst>
+    <p:notesMasterId r:id="rId12"/>
+  </p:notesMasterIdLst>
   <p:sldIdLst>
     <p:sldId id="256" r:id="rId2"/>
     <p:sldId id="257" r:id="rId3"/>
     <p:sldId id="266" r:id="rId4"/>
-    <p:sldId id="258" r:id="rId5"/>
-    <p:sldId id="260" r:id="rId6"/>
-    <p:sldId id="259" r:id="rId7"/>
-    <p:sldId id="267" r:id="rId8"/>
-    <p:sldId id="262" r:id="rId9"/>
-    <p:sldId id="268" r:id="rId10"/>
-    <p:sldId id="263" r:id="rId11"/>
-    <p:sldId id="265" r:id="rId12"/>
+    <p:sldId id="269" r:id="rId5"/>
+    <p:sldId id="271" r:id="rId6"/>
+    <p:sldId id="267" r:id="rId7"/>
+    <p:sldId id="262" r:id="rId8"/>
+    <p:sldId id="268" r:id="rId9"/>
+    <p:sldId id="263" r:id="rId10"/>
+    <p:sldId id="265" r:id="rId11"/>
   </p:sldIdLst>
   <p:sldSz cx="12192000" cy="6858000"/>
   <p:notesSz cx="6858000" cy="9144000"/>
@@ -114,7 +116,726 @@
       </a:defRPr>
     </a:lvl9pPr>
   </p:defaultTextStyle>
+  <p:extLst>
+    <p:ext uri="{EFAFB233-063F-42B5-8137-9DF3F51BA10A}">
+      <p15:sldGuideLst xmlns:p15="http://schemas.microsoft.com/office/powerpoint/2012/main"/>
+    </p:ext>
+  </p:extLst>
 </p:presentation>
+</file>
+
+<file path=ppt/notesMasters/notesMaster1.xml><?xml version="1.0" encoding="utf-8"?>
+<p:notesMaster xmlns:a="http://schemas.openxmlformats.org/drawingml/2006/main" xmlns:r="http://schemas.openxmlformats.org/officeDocument/2006/relationships" xmlns:p="http://schemas.openxmlformats.org/presentationml/2006/main">
+  <p:cSld>
+    <p:bg>
+      <p:bgRef idx="1001">
+        <a:schemeClr val="bg1"/>
+      </p:bgRef>
+    </p:bg>
+    <p:spTree>
+      <p:nvGrpSpPr>
+        <p:cNvPr id="1" name=""/>
+        <p:cNvGrpSpPr/>
+        <p:nvPr/>
+      </p:nvGrpSpPr>
+      <p:grpSpPr>
+        <a:xfrm>
+          <a:off x="0" y="0"/>
+          <a:ext cx="0" cy="0"/>
+          <a:chOff x="0" y="0"/>
+          <a:chExt cx="0" cy="0"/>
+        </a:xfrm>
+      </p:grpSpPr>
+      <p:sp>
+        <p:nvSpPr>
+          <p:cNvPr id="2" name="머리글 개체 틀 1"/>
+          <p:cNvSpPr>
+            <a:spLocks noGrp="1"/>
+          </p:cNvSpPr>
+          <p:nvPr>
+            <p:ph type="hdr" sz="quarter"/>
+          </p:nvPr>
+        </p:nvSpPr>
+        <p:spPr>
+          <a:xfrm>
+            <a:off x="0" y="0"/>
+            <a:ext cx="2971800" cy="458788"/>
+          </a:xfrm>
+          <a:prstGeom prst="rect">
+            <a:avLst/>
+          </a:prstGeom>
+        </p:spPr>
+        <p:txBody>
+          <a:bodyPr vert="horz" lIns="91440" tIns="45720" rIns="91440" bIns="45720" rtlCol="0"/>
+          <a:lstStyle>
+            <a:lvl1pPr algn="l">
+              <a:defRPr sz="1200"/>
+            </a:lvl1pPr>
+          </a:lstStyle>
+          <a:p>
+            <a:endParaRPr lang="ko-KR" altLang="en-US"/>
+          </a:p>
+        </p:txBody>
+      </p:sp>
+      <p:sp>
+        <p:nvSpPr>
+          <p:cNvPr id="3" name="날짜 개체 틀 2"/>
+          <p:cNvSpPr>
+            <a:spLocks noGrp="1"/>
+          </p:cNvSpPr>
+          <p:nvPr>
+            <p:ph type="dt" idx="1"/>
+          </p:nvPr>
+        </p:nvSpPr>
+        <p:spPr>
+          <a:xfrm>
+            <a:off x="3884613" y="0"/>
+            <a:ext cx="2971800" cy="458788"/>
+          </a:xfrm>
+          <a:prstGeom prst="rect">
+            <a:avLst/>
+          </a:prstGeom>
+        </p:spPr>
+        <p:txBody>
+          <a:bodyPr vert="horz" lIns="91440" tIns="45720" rIns="91440" bIns="45720" rtlCol="0"/>
+          <a:lstStyle>
+            <a:lvl1pPr algn="r">
+              <a:defRPr sz="1200"/>
+            </a:lvl1pPr>
+          </a:lstStyle>
+          <a:p>
+            <a:fld id="{8C6E51E7-5436-425B-B251-3FA1F61854D1}" type="datetimeFigureOut">
+              <a:rPr lang="ko-KR" altLang="en-US" smtClean="0"/>
+              <a:t>2019-03-08</a:t>
+            </a:fld>
+            <a:endParaRPr lang="ko-KR" altLang="en-US"/>
+          </a:p>
+        </p:txBody>
+      </p:sp>
+      <p:sp>
+        <p:nvSpPr>
+          <p:cNvPr id="4" name="슬라이드 이미지 개체 틀 3"/>
+          <p:cNvSpPr>
+            <a:spLocks noGrp="1" noRot="1" noChangeAspect="1"/>
+          </p:cNvSpPr>
+          <p:nvPr>
+            <p:ph type="sldImg" idx="2"/>
+          </p:nvPr>
+        </p:nvSpPr>
+        <p:spPr>
+          <a:xfrm>
+            <a:off x="685800" y="1143000"/>
+            <a:ext cx="5486400" cy="3086100"/>
+          </a:xfrm>
+          <a:prstGeom prst="rect">
+            <a:avLst/>
+          </a:prstGeom>
+          <a:noFill/>
+          <a:ln w="12700">
+            <a:solidFill>
+              <a:prstClr val="black"/>
+            </a:solidFill>
+          </a:ln>
+        </p:spPr>
+        <p:txBody>
+          <a:bodyPr vert="horz" lIns="91440" tIns="45720" rIns="91440" bIns="45720" rtlCol="0" anchor="ctr"/>
+          <a:lstStyle/>
+          <a:p>
+            <a:endParaRPr lang="ko-KR" altLang="en-US"/>
+          </a:p>
+        </p:txBody>
+      </p:sp>
+      <p:sp>
+        <p:nvSpPr>
+          <p:cNvPr id="5" name="슬라이드 노트 개체 틀 4"/>
+          <p:cNvSpPr>
+            <a:spLocks noGrp="1"/>
+          </p:cNvSpPr>
+          <p:nvPr>
+            <p:ph type="body" sz="quarter" idx="3"/>
+          </p:nvPr>
+        </p:nvSpPr>
+        <p:spPr>
+          <a:xfrm>
+            <a:off x="685800" y="4400550"/>
+            <a:ext cx="5486400" cy="3600450"/>
+          </a:xfrm>
+          <a:prstGeom prst="rect">
+            <a:avLst/>
+          </a:prstGeom>
+        </p:spPr>
+        <p:txBody>
+          <a:bodyPr vert="horz" lIns="91440" tIns="45720" rIns="91440" bIns="45720" rtlCol="0"/>
+          <a:lstStyle/>
+          <a:p>
+            <a:pPr lvl="0"/>
+            <a:r>
+              <a:rPr lang="ko-KR" altLang="en-US"/>
+              <a:t>마스터 텍스트 스타일 편집</a:t>
+            </a:r>
+          </a:p>
+          <a:p>
+            <a:pPr lvl="1"/>
+            <a:r>
+              <a:rPr lang="ko-KR" altLang="en-US"/>
+              <a:t>둘째 수준</a:t>
+            </a:r>
+          </a:p>
+          <a:p>
+            <a:pPr lvl="2"/>
+            <a:r>
+              <a:rPr lang="ko-KR" altLang="en-US"/>
+              <a:t>셋째 수준</a:t>
+            </a:r>
+          </a:p>
+          <a:p>
+            <a:pPr lvl="3"/>
+            <a:r>
+              <a:rPr lang="ko-KR" altLang="en-US"/>
+              <a:t>넷째 수준</a:t>
+            </a:r>
+          </a:p>
+          <a:p>
+            <a:pPr lvl="4"/>
+            <a:r>
+              <a:rPr lang="ko-KR" altLang="en-US"/>
+              <a:t>다섯째 수준</a:t>
+            </a:r>
+          </a:p>
+        </p:txBody>
+      </p:sp>
+      <p:sp>
+        <p:nvSpPr>
+          <p:cNvPr id="6" name="바닥글 개체 틀 5"/>
+          <p:cNvSpPr>
+            <a:spLocks noGrp="1"/>
+          </p:cNvSpPr>
+          <p:nvPr>
+            <p:ph type="ftr" sz="quarter" idx="4"/>
+          </p:nvPr>
+        </p:nvSpPr>
+        <p:spPr>
+          <a:xfrm>
+            <a:off x="0" y="8685213"/>
+            <a:ext cx="2971800" cy="458787"/>
+          </a:xfrm>
+          <a:prstGeom prst="rect">
+            <a:avLst/>
+          </a:prstGeom>
+        </p:spPr>
+        <p:txBody>
+          <a:bodyPr vert="horz" lIns="91440" tIns="45720" rIns="91440" bIns="45720" rtlCol="0" anchor="b"/>
+          <a:lstStyle>
+            <a:lvl1pPr algn="l">
+              <a:defRPr sz="1200"/>
+            </a:lvl1pPr>
+          </a:lstStyle>
+          <a:p>
+            <a:endParaRPr lang="ko-KR" altLang="en-US"/>
+          </a:p>
+        </p:txBody>
+      </p:sp>
+      <p:sp>
+        <p:nvSpPr>
+          <p:cNvPr id="7" name="슬라이드 번호 개체 틀 6"/>
+          <p:cNvSpPr>
+            <a:spLocks noGrp="1"/>
+          </p:cNvSpPr>
+          <p:nvPr>
+            <p:ph type="sldNum" sz="quarter" idx="5"/>
+          </p:nvPr>
+        </p:nvSpPr>
+        <p:spPr>
+          <a:xfrm>
+            <a:off x="3884613" y="8685213"/>
+            <a:ext cx="2971800" cy="458787"/>
+          </a:xfrm>
+          <a:prstGeom prst="rect">
+            <a:avLst/>
+          </a:prstGeom>
+        </p:spPr>
+        <p:txBody>
+          <a:bodyPr vert="horz" lIns="91440" tIns="45720" rIns="91440" bIns="45720" rtlCol="0" anchor="b"/>
+          <a:lstStyle>
+            <a:lvl1pPr algn="r">
+              <a:defRPr sz="1200"/>
+            </a:lvl1pPr>
+          </a:lstStyle>
+          <a:p>
+            <a:fld id="{DE34B2CC-81B5-4D88-9083-0962A09C5EE8}" type="slidenum">
+              <a:rPr lang="ko-KR" altLang="en-US" smtClean="0"/>
+              <a:t>‹#›</a:t>
+            </a:fld>
+            <a:endParaRPr lang="ko-KR" altLang="en-US"/>
+          </a:p>
+        </p:txBody>
+      </p:sp>
+    </p:spTree>
+    <p:extLst>
+      <p:ext uri="{BB962C8B-B14F-4D97-AF65-F5344CB8AC3E}">
+        <p14:creationId xmlns:p14="http://schemas.microsoft.com/office/powerpoint/2010/main" val="3119909637"/>
+      </p:ext>
+    </p:extLst>
+  </p:cSld>
+  <p:clrMap bg1="lt1" tx1="dk1" bg2="lt2" tx2="dk2" accent1="accent1" accent2="accent2" accent3="accent3" accent4="accent4" accent5="accent5" accent6="accent6" hlink="hlink" folHlink="folHlink"/>
+  <p:notesStyle>
+    <a:lvl1pPr marL="0" algn="l" defTabSz="914400" rtl="0" eaLnBrk="1" latinLnBrk="1" hangingPunct="1">
+      <a:defRPr sz="1200" kern="1200">
+        <a:solidFill>
+          <a:schemeClr val="tx1"/>
+        </a:solidFill>
+        <a:latin typeface="+mn-lt"/>
+        <a:ea typeface="+mn-ea"/>
+        <a:cs typeface="+mn-cs"/>
+      </a:defRPr>
+    </a:lvl1pPr>
+    <a:lvl2pPr marL="457200" algn="l" defTabSz="914400" rtl="0" eaLnBrk="1" latinLnBrk="1" hangingPunct="1">
+      <a:defRPr sz="1200" kern="1200">
+        <a:solidFill>
+          <a:schemeClr val="tx1"/>
+        </a:solidFill>
+        <a:latin typeface="+mn-lt"/>
+        <a:ea typeface="+mn-ea"/>
+        <a:cs typeface="+mn-cs"/>
+      </a:defRPr>
+    </a:lvl2pPr>
+    <a:lvl3pPr marL="914400" algn="l" defTabSz="914400" rtl="0" eaLnBrk="1" latinLnBrk="1" hangingPunct="1">
+      <a:defRPr sz="1200" kern="1200">
+        <a:solidFill>
+          <a:schemeClr val="tx1"/>
+        </a:solidFill>
+        <a:latin typeface="+mn-lt"/>
+        <a:ea typeface="+mn-ea"/>
+        <a:cs typeface="+mn-cs"/>
+      </a:defRPr>
+    </a:lvl3pPr>
+    <a:lvl4pPr marL="1371600" algn="l" defTabSz="914400" rtl="0" eaLnBrk="1" latinLnBrk="1" hangingPunct="1">
+      <a:defRPr sz="1200" kern="1200">
+        <a:solidFill>
+          <a:schemeClr val="tx1"/>
+        </a:solidFill>
+        <a:latin typeface="+mn-lt"/>
+        <a:ea typeface="+mn-ea"/>
+        <a:cs typeface="+mn-cs"/>
+      </a:defRPr>
+    </a:lvl4pPr>
+    <a:lvl5pPr marL="1828800" algn="l" defTabSz="914400" rtl="0" eaLnBrk="1" latinLnBrk="1" hangingPunct="1">
+      <a:defRPr sz="1200" kern="1200">
+        <a:solidFill>
+          <a:schemeClr val="tx1"/>
+        </a:solidFill>
+        <a:latin typeface="+mn-lt"/>
+        <a:ea typeface="+mn-ea"/>
+        <a:cs typeface="+mn-cs"/>
+      </a:defRPr>
+    </a:lvl5pPr>
+    <a:lvl6pPr marL="2286000" algn="l" defTabSz="914400" rtl="0" eaLnBrk="1" latinLnBrk="1" hangingPunct="1">
+      <a:defRPr sz="1200" kern="1200">
+        <a:solidFill>
+          <a:schemeClr val="tx1"/>
+        </a:solidFill>
+        <a:latin typeface="+mn-lt"/>
+        <a:ea typeface="+mn-ea"/>
+        <a:cs typeface="+mn-cs"/>
+      </a:defRPr>
+    </a:lvl6pPr>
+    <a:lvl7pPr marL="2743200" algn="l" defTabSz="914400" rtl="0" eaLnBrk="1" latinLnBrk="1" hangingPunct="1">
+      <a:defRPr sz="1200" kern="1200">
+        <a:solidFill>
+          <a:schemeClr val="tx1"/>
+        </a:solidFill>
+        <a:latin typeface="+mn-lt"/>
+        <a:ea typeface="+mn-ea"/>
+        <a:cs typeface="+mn-cs"/>
+      </a:defRPr>
+    </a:lvl7pPr>
+    <a:lvl8pPr marL="3200400" algn="l" defTabSz="914400" rtl="0" eaLnBrk="1" latinLnBrk="1" hangingPunct="1">
+      <a:defRPr sz="1200" kern="1200">
+        <a:solidFill>
+          <a:schemeClr val="tx1"/>
+        </a:solidFill>
+        <a:latin typeface="+mn-lt"/>
+        <a:ea typeface="+mn-ea"/>
+        <a:cs typeface="+mn-cs"/>
+      </a:defRPr>
+    </a:lvl8pPr>
+    <a:lvl9pPr marL="3657600" algn="l" defTabSz="914400" rtl="0" eaLnBrk="1" latinLnBrk="1" hangingPunct="1">
+      <a:defRPr sz="1200" kern="1200">
+        <a:solidFill>
+          <a:schemeClr val="tx1"/>
+        </a:solidFill>
+        <a:latin typeface="+mn-lt"/>
+        <a:ea typeface="+mn-ea"/>
+        <a:cs typeface="+mn-cs"/>
+      </a:defRPr>
+    </a:lvl9pPr>
+  </p:notesStyle>
+</p:notesMaster>
+</file>
+
+<file path=ppt/notesSlides/notesSlide1.xml><?xml version="1.0" encoding="utf-8"?>
+<p:notes xmlns:a="http://schemas.openxmlformats.org/drawingml/2006/main" xmlns:r="http://schemas.openxmlformats.org/officeDocument/2006/relationships" xmlns:p="http://schemas.openxmlformats.org/presentationml/2006/main">
+  <p:cSld>
+    <p:spTree>
+      <p:nvGrpSpPr>
+        <p:cNvPr id="1" name=""/>
+        <p:cNvGrpSpPr/>
+        <p:nvPr/>
+      </p:nvGrpSpPr>
+      <p:grpSpPr>
+        <a:xfrm>
+          <a:off x="0" y="0"/>
+          <a:ext cx="0" cy="0"/>
+          <a:chOff x="0" y="0"/>
+          <a:chExt cx="0" cy="0"/>
+        </a:xfrm>
+      </p:grpSpPr>
+      <p:sp>
+        <p:nvSpPr>
+          <p:cNvPr id="2" name="슬라이드 이미지 개체 틀 1"/>
+          <p:cNvSpPr>
+            <a:spLocks noGrp="1" noRot="1" noChangeAspect="1"/>
+          </p:cNvSpPr>
+          <p:nvPr>
+            <p:ph type="sldImg"/>
+          </p:nvPr>
+        </p:nvSpPr>
+        <p:spPr/>
+      </p:sp>
+      <p:sp>
+        <p:nvSpPr>
+          <p:cNvPr id="3" name="슬라이드 노트 개체 틀 2"/>
+          <p:cNvSpPr>
+            <a:spLocks noGrp="1"/>
+          </p:cNvSpPr>
+          <p:nvPr>
+            <p:ph type="body" idx="1"/>
+          </p:nvPr>
+        </p:nvSpPr>
+        <p:spPr/>
+        <p:txBody>
+          <a:bodyPr/>
+          <a:lstStyle/>
+          <a:p>
+            <a:pPr marL="285750" indent="-285750">
+              <a:buFontTx/>
+              <a:buChar char="-"/>
+            </a:pPr>
+            <a:r>
+              <a:rPr lang="ko-KR" altLang="en-US" dirty="0"/>
+              <a:t>당뇨병 유병률 증가</a:t>
+            </a:r>
+            <a:endParaRPr lang="en-US" altLang="ko-KR" dirty="0"/>
+          </a:p>
+          <a:p>
+            <a:pPr marL="742950" lvl="1" indent="-285750">
+              <a:buFontTx/>
+              <a:buChar char="-"/>
+            </a:pPr>
+            <a:r>
+              <a:rPr lang="en-US" altLang="ko-KR" dirty="0"/>
+              <a:t>2010</a:t>
+            </a:r>
+            <a:r>
+              <a:rPr lang="ko-KR" altLang="en-US" dirty="0"/>
+              <a:t>년</a:t>
+            </a:r>
+            <a:r>
+              <a:rPr lang="en-US" altLang="ko-KR" dirty="0"/>
+              <a:t>: 201</a:t>
+            </a:r>
+            <a:r>
+              <a:rPr lang="ko-KR" altLang="en-US" dirty="0"/>
+              <a:t>만 </a:t>
+            </a:r>
+            <a:r>
+              <a:rPr lang="en-US" altLang="ko-KR" dirty="0"/>
+              <a:t>9000</a:t>
+            </a:r>
+            <a:r>
+              <a:rPr lang="ko-KR" altLang="en-US" dirty="0"/>
+              <a:t>명 </a:t>
+            </a:r>
+            <a:r>
+              <a:rPr lang="en-US" altLang="ko-KR" dirty="0"/>
+              <a:t>-&gt; 2015</a:t>
+            </a:r>
+            <a:r>
+              <a:rPr lang="ko-KR" altLang="en-US" dirty="0"/>
+              <a:t>년 </a:t>
+            </a:r>
+            <a:r>
+              <a:rPr lang="en-US" altLang="ko-KR" dirty="0"/>
+              <a:t>251</a:t>
+            </a:r>
+            <a:r>
+              <a:rPr lang="ko-KR" altLang="en-US" dirty="0"/>
+              <a:t>만 </a:t>
+            </a:r>
+            <a:r>
+              <a:rPr lang="en-US" altLang="ko-KR" dirty="0"/>
+              <a:t>5000</a:t>
+            </a:r>
+            <a:r>
+              <a:rPr lang="ko-KR" altLang="en-US" dirty="0"/>
+              <a:t>명</a:t>
+            </a:r>
+            <a:endParaRPr lang="en-US" altLang="ko-KR" dirty="0"/>
+          </a:p>
+          <a:p>
+            <a:pPr marL="285750" indent="-285750">
+              <a:buFontTx/>
+              <a:buChar char="-"/>
+            </a:pPr>
+            <a:r>
+              <a:rPr lang="ko-KR" altLang="en-US" dirty="0"/>
+              <a:t>지속적 라이프스타일 관리의 필요성</a:t>
+            </a:r>
+            <a:endParaRPr lang="en-US" altLang="ko-KR" dirty="0"/>
+          </a:p>
+          <a:p>
+            <a:pPr marL="742950" lvl="1" indent="-285750">
+              <a:buFontTx/>
+              <a:buChar char="-"/>
+            </a:pPr>
+            <a:r>
+              <a:rPr lang="ko-KR" altLang="en-US" dirty="0"/>
+              <a:t>당뇨병은 만성 질환으로 지속적인 관리가 필요</a:t>
+            </a:r>
+            <a:endParaRPr lang="en-US" altLang="ko-KR" dirty="0"/>
+          </a:p>
+          <a:p>
+            <a:pPr marL="285750" indent="-285750">
+              <a:buFontTx/>
+              <a:buChar char="-"/>
+            </a:pPr>
+            <a:r>
+              <a:rPr lang="ko-KR" altLang="en-US" dirty="0"/>
+              <a:t>당뇨병과 우울증 사이의 인과 관계</a:t>
+            </a:r>
+            <a:endParaRPr lang="en-US" altLang="ko-KR" dirty="0"/>
+          </a:p>
+          <a:p>
+            <a:pPr marL="742950" lvl="1" indent="-285750">
+              <a:buFontTx/>
+              <a:buChar char="-"/>
+            </a:pPr>
+            <a:r>
+              <a:rPr lang="ko-KR" altLang="en-US" dirty="0"/>
+              <a:t>일반 인구에 비해 우울증 </a:t>
+            </a:r>
+            <a:r>
+              <a:rPr lang="ko-KR" altLang="en-US" dirty="0" err="1"/>
+              <a:t>유병율</a:t>
+            </a:r>
+            <a:r>
+              <a:rPr lang="ko-KR" altLang="en-US" dirty="0"/>
+              <a:t> 약 </a:t>
+            </a:r>
+            <a:r>
+              <a:rPr lang="en-US" altLang="ko-KR" dirty="0"/>
+              <a:t>2</a:t>
+            </a:r>
+            <a:r>
+              <a:rPr lang="ko-KR" altLang="en-US" dirty="0"/>
+              <a:t>배 높음</a:t>
+            </a:r>
+            <a:endParaRPr lang="en-US" altLang="ko-KR" dirty="0"/>
+          </a:p>
+          <a:p>
+            <a:pPr marL="285750" indent="-285750">
+              <a:buFontTx/>
+              <a:buChar char="-"/>
+            </a:pPr>
+            <a:r>
+              <a:rPr lang="ko-KR" altLang="en-US" dirty="0"/>
+              <a:t>기존 어플리케이션의 한계</a:t>
+            </a:r>
+            <a:endParaRPr lang="en-US" altLang="ko-KR" dirty="0"/>
+          </a:p>
+          <a:p>
+            <a:pPr marL="742950" lvl="1" indent="-285750">
+              <a:buFontTx/>
+              <a:buChar char="-"/>
+            </a:pPr>
+            <a:r>
+              <a:rPr lang="ko-KR" altLang="en-US" dirty="0"/>
+              <a:t>단순한 생활 관리에만 초점</a:t>
+            </a:r>
+          </a:p>
+          <a:p>
+            <a:endParaRPr lang="ko-KR" altLang="en-US" dirty="0"/>
+          </a:p>
+        </p:txBody>
+      </p:sp>
+      <p:sp>
+        <p:nvSpPr>
+          <p:cNvPr id="4" name="슬라이드 번호 개체 틀 3"/>
+          <p:cNvSpPr>
+            <a:spLocks noGrp="1"/>
+          </p:cNvSpPr>
+          <p:nvPr>
+            <p:ph type="sldNum" sz="quarter" idx="5"/>
+          </p:nvPr>
+        </p:nvSpPr>
+        <p:spPr/>
+        <p:txBody>
+          <a:bodyPr/>
+          <a:lstStyle/>
+          <a:p>
+            <a:fld id="{DE34B2CC-81B5-4D88-9083-0962A09C5EE8}" type="slidenum">
+              <a:rPr lang="ko-KR" altLang="en-US" smtClean="0"/>
+              <a:t>4</a:t>
+            </a:fld>
+            <a:endParaRPr lang="ko-KR" altLang="en-US"/>
+          </a:p>
+        </p:txBody>
+      </p:sp>
+    </p:spTree>
+    <p:extLst>
+      <p:ext uri="{BB962C8B-B14F-4D97-AF65-F5344CB8AC3E}">
+        <p14:creationId xmlns:p14="http://schemas.microsoft.com/office/powerpoint/2010/main" val="1015480073"/>
+      </p:ext>
+    </p:extLst>
+  </p:cSld>
+  <p:clrMapOvr>
+    <a:masterClrMapping/>
+  </p:clrMapOvr>
+</p:notes>
+</file>
+
+<file path=ppt/notesSlides/notesSlide2.xml><?xml version="1.0" encoding="utf-8"?>
+<p:notes xmlns:a="http://schemas.openxmlformats.org/drawingml/2006/main" xmlns:r="http://schemas.openxmlformats.org/officeDocument/2006/relationships" xmlns:p="http://schemas.openxmlformats.org/presentationml/2006/main">
+  <p:cSld>
+    <p:spTree>
+      <p:nvGrpSpPr>
+        <p:cNvPr id="1" name=""/>
+        <p:cNvGrpSpPr/>
+        <p:nvPr/>
+      </p:nvGrpSpPr>
+      <p:grpSpPr>
+        <a:xfrm>
+          <a:off x="0" y="0"/>
+          <a:ext cx="0" cy="0"/>
+          <a:chOff x="0" y="0"/>
+          <a:chExt cx="0" cy="0"/>
+        </a:xfrm>
+      </p:grpSpPr>
+      <p:sp>
+        <p:nvSpPr>
+          <p:cNvPr id="2" name="슬라이드 이미지 개체 틀 1"/>
+          <p:cNvSpPr>
+            <a:spLocks noGrp="1" noRot="1" noChangeAspect="1"/>
+          </p:cNvSpPr>
+          <p:nvPr>
+            <p:ph type="sldImg"/>
+          </p:nvPr>
+        </p:nvSpPr>
+        <p:spPr/>
+      </p:sp>
+      <p:sp>
+        <p:nvSpPr>
+          <p:cNvPr id="3" name="슬라이드 노트 개체 틀 2"/>
+          <p:cNvSpPr>
+            <a:spLocks noGrp="1"/>
+          </p:cNvSpPr>
+          <p:nvPr>
+            <p:ph type="body" idx="1"/>
+          </p:nvPr>
+        </p:nvSpPr>
+        <p:spPr/>
+        <p:txBody>
+          <a:bodyPr/>
+          <a:lstStyle/>
+          <a:p>
+            <a:pPr marL="0" indent="0">
+              <a:buNone/>
+            </a:pPr>
+            <a:r>
+              <a:rPr lang="ko-KR" altLang="en-US" sz="1200" dirty="0"/>
+              <a:t>미국의 </a:t>
+            </a:r>
+            <a:r>
+              <a:rPr lang="en-US" altLang="ko-KR" sz="1200" dirty="0"/>
+              <a:t>A. T. Beck</a:t>
+            </a:r>
+            <a:r>
+              <a:rPr lang="ko-KR" altLang="en-US" sz="1200" dirty="0"/>
+              <a:t>이 개발한 심리치료 도구로 널리 쓰임</a:t>
+            </a:r>
+            <a:endParaRPr lang="en-US" altLang="ko-KR" sz="1200" dirty="0"/>
+          </a:p>
+          <a:p>
+            <a:pPr marL="0" indent="0">
+              <a:buNone/>
+            </a:pPr>
+            <a:r>
+              <a:rPr lang="ko-KR" altLang="en-US" sz="1200" dirty="0"/>
+              <a:t>수많은 임상 </a:t>
+            </a:r>
+            <a:r>
+              <a:rPr lang="ko-KR" altLang="en-US" sz="1200" dirty="0" err="1"/>
+              <a:t>실혐</a:t>
+            </a:r>
+            <a:r>
+              <a:rPr lang="ko-KR" altLang="en-US" sz="1200" dirty="0"/>
+              <a:t> 결과로 그 효과가 과학적으로 뒷받침됨</a:t>
+            </a:r>
+            <a:endParaRPr lang="en-US" altLang="ko-KR" sz="1200" dirty="0"/>
+          </a:p>
+          <a:p>
+            <a:pPr marL="0" indent="0">
+              <a:buNone/>
+            </a:pPr>
+            <a:r>
+              <a:rPr lang="ko-KR" altLang="en-US" dirty="0"/>
+              <a:t>치료자와의 직접적인 상담 뿐만 아니라 자조</a:t>
+            </a:r>
+            <a:r>
+              <a:rPr lang="en-US" altLang="ko-KR" dirty="0"/>
+              <a:t>(self-help), </a:t>
+            </a:r>
+            <a:r>
+              <a:rPr lang="ko-KR" altLang="en-US" dirty="0"/>
+              <a:t>즉 혼자서도 책이나 어플리케이션으로 진행할 수 있음</a:t>
+            </a:r>
+          </a:p>
+        </p:txBody>
+      </p:sp>
+      <p:sp>
+        <p:nvSpPr>
+          <p:cNvPr id="4" name="슬라이드 번호 개체 틀 3"/>
+          <p:cNvSpPr>
+            <a:spLocks noGrp="1"/>
+          </p:cNvSpPr>
+          <p:nvPr>
+            <p:ph type="sldNum" sz="quarter" idx="5"/>
+          </p:nvPr>
+        </p:nvSpPr>
+        <p:spPr/>
+        <p:txBody>
+          <a:bodyPr/>
+          <a:lstStyle/>
+          <a:p>
+            <a:fld id="{DE34B2CC-81B5-4D88-9083-0962A09C5EE8}" type="slidenum">
+              <a:rPr lang="ko-KR" altLang="en-US" smtClean="0"/>
+              <a:t>5</a:t>
+            </a:fld>
+            <a:endParaRPr lang="ko-KR" altLang="en-US"/>
+          </a:p>
+        </p:txBody>
+      </p:sp>
+    </p:spTree>
+    <p:extLst>
+      <p:ext uri="{BB962C8B-B14F-4D97-AF65-F5344CB8AC3E}">
+        <p14:creationId xmlns:p14="http://schemas.microsoft.com/office/powerpoint/2010/main" val="3103617105"/>
+      </p:ext>
+    </p:extLst>
+  </p:cSld>
+  <p:clrMapOvr>
+    <a:masterClrMapping/>
+  </p:clrMapOvr>
+</p:notes>
 </file>
 
 <file path=ppt/slideLayouts/slideLayout1.xml><?xml version="1.0" encoding="utf-8"?>
@@ -3414,8 +4135,8 @@
         </p:nvSpPr>
         <p:spPr>
           <a:xfrm>
-            <a:off x="738232" y="897622"/>
-            <a:ext cx="10645634" cy="646331"/>
+            <a:off x="174171" y="679905"/>
+            <a:ext cx="11773756" cy="1323439"/>
           </a:xfrm>
           <a:prstGeom prst="rect">
             <a:avLst/>
@@ -3430,8 +4151,15 @@
           <a:p>
             <a:pPr algn="ctr"/>
             <a:r>
-              <a:rPr lang="ko-KR" altLang="en-US" sz="3600" dirty="0"/>
-              <a:t>심리치료 기법을 적용한 당뇨병 관리 어플리케이션</a:t>
+              <a:rPr lang="ko-KR" altLang="en-US" sz="4000" dirty="0"/>
+              <a:t>인지행동치료 기법을 적용한</a:t>
+            </a:r>
+            <a:br>
+              <a:rPr lang="en-US" altLang="ko-KR" sz="4000" dirty="0"/>
+            </a:br>
+            <a:r>
+              <a:rPr lang="ko-KR" altLang="en-US" sz="4000" dirty="0"/>
+              <a:t> 당뇨병 관리 모바일 어플리케이션</a:t>
             </a:r>
           </a:p>
         </p:txBody>
@@ -3445,13 +4173,15 @@
               </a:ext>
             </a:extLst>
           </p:cNvPr>
-          <p:cNvCxnSpPr/>
+          <p:cNvCxnSpPr>
+            <a:cxnSpLocks/>
+          </p:cNvCxnSpPr>
           <p:nvPr/>
         </p:nvCxnSpPr>
         <p:spPr>
           <a:xfrm>
-            <a:off x="813732" y="1585519"/>
-            <a:ext cx="10536578" cy="0"/>
+            <a:off x="853440" y="1994263"/>
+            <a:ext cx="10496870" cy="35393"/>
           </a:xfrm>
           <a:prstGeom prst="line">
             <a:avLst/>
@@ -3491,207 +4221,6 @@
 </file>
 
 <file path=ppt/slides/slide10.xml><?xml version="1.0" encoding="utf-8"?>
-<p:sld xmlns:a="http://schemas.openxmlformats.org/drawingml/2006/main" xmlns:r="http://schemas.openxmlformats.org/officeDocument/2006/relationships" xmlns:p="http://schemas.openxmlformats.org/presentationml/2006/main">
-  <p:cSld>
-    <p:spTree>
-      <p:nvGrpSpPr>
-        <p:cNvPr id="1" name=""/>
-        <p:cNvGrpSpPr/>
-        <p:nvPr/>
-      </p:nvGrpSpPr>
-      <p:grpSpPr>
-        <a:xfrm>
-          <a:off x="0" y="0"/>
-          <a:ext cx="0" cy="0"/>
-          <a:chOff x="0" y="0"/>
-          <a:chExt cx="0" cy="0"/>
-        </a:xfrm>
-      </p:grpSpPr>
-      <p:sp>
-        <p:nvSpPr>
-          <p:cNvPr id="3" name="TextBox 2">
-            <a:extLst>
-              <a:ext uri="{FF2B5EF4-FFF2-40B4-BE49-F238E27FC236}">
-                <a16:creationId xmlns:a16="http://schemas.microsoft.com/office/drawing/2014/main" id="{C7AA742C-ED08-4B59-8545-43A9213CE802}"/>
-              </a:ext>
-            </a:extLst>
-          </p:cNvPr>
-          <p:cNvSpPr txBox="1"/>
-          <p:nvPr/>
-        </p:nvSpPr>
-        <p:spPr>
-          <a:xfrm>
-            <a:off x="637564" y="566678"/>
-            <a:ext cx="11232858" cy="2862322"/>
-          </a:xfrm>
-          <a:prstGeom prst="rect">
-            <a:avLst/>
-          </a:prstGeom>
-          <a:noFill/>
-        </p:spPr>
-        <p:txBody>
-          <a:bodyPr wrap="square" rtlCol="0">
-            <a:spAutoFit/>
-          </a:bodyPr>
-          <a:lstStyle/>
-          <a:p>
-            <a:pPr marL="342900" indent="-342900">
-              <a:buAutoNum type="arabicPeriod"/>
-            </a:pPr>
-            <a:r>
-              <a:rPr lang="ko-KR" altLang="en-US" dirty="0"/>
-              <a:t>개인 정보 처리</a:t>
-            </a:r>
-            <a:endParaRPr lang="en-US" altLang="ko-KR" dirty="0"/>
-          </a:p>
-          <a:p>
-            <a:r>
-              <a:rPr lang="en-US" altLang="ko-KR" dirty="0"/>
-              <a:t>	- </a:t>
-            </a:r>
-            <a:r>
-              <a:rPr lang="ko-KR" altLang="en-US" dirty="0"/>
-              <a:t>로그인 기능</a:t>
-            </a:r>
-            <a:endParaRPr lang="en-US" altLang="ko-KR" dirty="0"/>
-          </a:p>
-          <a:p>
-            <a:r>
-              <a:rPr lang="en-US" altLang="ko-KR" dirty="0"/>
-              <a:t>	- </a:t>
-            </a:r>
-            <a:r>
-              <a:rPr lang="ko-KR" altLang="en-US" dirty="0"/>
-              <a:t>암호화 처리</a:t>
-            </a:r>
-            <a:endParaRPr lang="en-US" altLang="ko-KR" dirty="0"/>
-          </a:p>
-          <a:p>
-            <a:pPr marL="342900" indent="-342900">
-              <a:buAutoNum type="arabicPeriod" startAt="2"/>
-            </a:pPr>
-            <a:r>
-              <a:rPr lang="ko-KR" altLang="en-US" dirty="0"/>
-              <a:t>생체정보 저장 기능</a:t>
-            </a:r>
-            <a:endParaRPr lang="en-US" altLang="ko-KR" dirty="0"/>
-          </a:p>
-          <a:p>
-            <a:r>
-              <a:rPr lang="en-US" altLang="ko-KR" dirty="0"/>
-              <a:t>	- </a:t>
-            </a:r>
-            <a:r>
-              <a:rPr lang="ko-KR" altLang="en-US" dirty="0"/>
-              <a:t>혈당 수치 기록 기능</a:t>
-            </a:r>
-            <a:endParaRPr lang="en-US" altLang="ko-KR" dirty="0"/>
-          </a:p>
-          <a:p>
-            <a:r>
-              <a:rPr lang="en-US" altLang="ko-KR" dirty="0"/>
-              <a:t>	- </a:t>
-            </a:r>
-            <a:r>
-              <a:rPr lang="ko-KR" altLang="en-US" dirty="0"/>
-              <a:t>투약 관련 기록 기능</a:t>
-            </a:r>
-            <a:endParaRPr lang="en-US" altLang="ko-KR" dirty="0"/>
-          </a:p>
-          <a:p>
-            <a:r>
-              <a:rPr lang="en-US" altLang="ko-KR" dirty="0"/>
-              <a:t>	- </a:t>
-            </a:r>
-            <a:r>
-              <a:rPr lang="ko-KR" altLang="en-US" dirty="0"/>
-              <a:t>식단 기록 기능</a:t>
-            </a:r>
-            <a:endParaRPr lang="en-US" altLang="ko-KR" dirty="0"/>
-          </a:p>
-          <a:p>
-            <a:pPr marL="342900" indent="-342900">
-              <a:buAutoNum type="arabicPeriod" startAt="3"/>
-            </a:pPr>
-            <a:r>
-              <a:rPr lang="ko-KR" altLang="en-US" dirty="0"/>
-              <a:t>심리치료 기능</a:t>
-            </a:r>
-            <a:endParaRPr lang="en-US" altLang="ko-KR" dirty="0"/>
-          </a:p>
-          <a:p>
-            <a:r>
-              <a:rPr lang="en-US" altLang="ko-KR" dirty="0"/>
-              <a:t>	- </a:t>
-            </a:r>
-            <a:r>
-              <a:rPr lang="ko-KR" altLang="en-US" dirty="0"/>
-              <a:t>텍스트 기반 심리상태 기록 및 저장 기능</a:t>
-            </a:r>
-            <a:endParaRPr lang="en-US" altLang="ko-KR" dirty="0"/>
-          </a:p>
-          <a:p>
-            <a:r>
-              <a:rPr lang="en-US" altLang="ko-KR" dirty="0"/>
-              <a:t>	- </a:t>
-            </a:r>
-            <a:r>
-              <a:rPr lang="ko-KR" altLang="en-US" dirty="0"/>
-              <a:t>입력된 심리상태 기본적 분석 기능</a:t>
-            </a:r>
-            <a:endParaRPr lang="en-US" altLang="ko-KR" dirty="0"/>
-          </a:p>
-        </p:txBody>
-      </p:sp>
-      <p:pic>
-        <p:nvPicPr>
-          <p:cNvPr id="5" name="그림 4">
-            <a:extLst>
-              <a:ext uri="{FF2B5EF4-FFF2-40B4-BE49-F238E27FC236}">
-                <a16:creationId xmlns:a16="http://schemas.microsoft.com/office/drawing/2014/main" id="{4934375C-3242-48E5-8DBB-A06A92B78F72}"/>
-              </a:ext>
-            </a:extLst>
-          </p:cNvPr>
-          <p:cNvPicPr>
-            <a:picLocks noChangeAspect="1"/>
-          </p:cNvPicPr>
-          <p:nvPr/>
-        </p:nvPicPr>
-        <p:blipFill>
-          <a:blip r:embed="rId2"/>
-          <a:stretch>
-            <a:fillRect/>
-          </a:stretch>
-        </p:blipFill>
-        <p:spPr>
-          <a:xfrm>
-            <a:off x="157993" y="3694113"/>
-            <a:ext cx="11859836" cy="2874880"/>
-          </a:xfrm>
-          <a:prstGeom prst="rect">
-            <a:avLst/>
-          </a:prstGeom>
-          <a:ln>
-            <a:solidFill>
-              <a:schemeClr val="accent1"/>
-            </a:solidFill>
-          </a:ln>
-        </p:spPr>
-      </p:pic>
-    </p:spTree>
-    <p:extLst>
-      <p:ext uri="{BB962C8B-B14F-4D97-AF65-F5344CB8AC3E}">
-        <p14:creationId xmlns:p14="http://schemas.microsoft.com/office/powerpoint/2010/main" val="1873579609"/>
-      </p:ext>
-    </p:extLst>
-  </p:cSld>
-  <p:clrMapOvr>
-    <a:masterClrMapping/>
-  </p:clrMapOvr>
-</p:sld>
-</file>
-
-<file path=ppt/slides/slide11.xml><?xml version="1.0" encoding="utf-8"?>
 <p:sld xmlns:a="http://schemas.openxmlformats.org/drawingml/2006/main" xmlns:r="http://schemas.openxmlformats.org/officeDocument/2006/relationships" xmlns:p="http://schemas.openxmlformats.org/presentationml/2006/main">
   <p:cSld>
     <p:spTree>
@@ -3865,8 +4394,8 @@
         </p:nvSpPr>
         <p:spPr>
           <a:xfrm>
-            <a:off x="1551963" y="4043493"/>
-            <a:ext cx="1644243" cy="523220"/>
+            <a:off x="1378511" y="4043493"/>
+            <a:ext cx="1817696" cy="1384995"/>
           </a:xfrm>
           <a:prstGeom prst="rect">
             <a:avLst/>
@@ -3881,10 +4410,24 @@
           <a:p>
             <a:pPr algn="ctr"/>
             <a:r>
-              <a:rPr lang="ko-KR" altLang="en-US" sz="2800"/>
-              <a:t>개발배경 </a:t>
-            </a:r>
-            <a:endParaRPr lang="ko-KR" altLang="en-US" sz="2800" dirty="0"/>
+              <a:rPr lang="ko-KR" altLang="en-US" sz="2800" dirty="0"/>
+              <a:t>개발 배경</a:t>
+            </a:r>
+            <a:br>
+              <a:rPr lang="en-US" altLang="ko-KR" sz="2800" dirty="0"/>
+            </a:br>
+            <a:r>
+              <a:rPr lang="ko-KR" altLang="en-US" sz="2800" dirty="0"/>
+              <a:t>및</a:t>
+            </a:r>
+            <a:endParaRPr lang="en-US" altLang="ko-KR" sz="2800" dirty="0"/>
+          </a:p>
+          <a:p>
+            <a:pPr algn="ctr"/>
+            <a:r>
+              <a:rPr lang="ko-KR" altLang="en-US" sz="2800" dirty="0"/>
+              <a:t>소개 </a:t>
+            </a:r>
           </a:p>
         </p:txBody>
       </p:sp>
@@ -3902,7 +4445,7 @@
         </p:nvSpPr>
         <p:spPr>
           <a:xfrm>
-            <a:off x="4085439" y="4043493"/>
+            <a:off x="3929824" y="4043493"/>
             <a:ext cx="1912437" cy="523220"/>
           </a:xfrm>
           <a:prstGeom prst="rect">
@@ -3938,7 +4481,7 @@
         </p:nvSpPr>
         <p:spPr>
           <a:xfrm>
-            <a:off x="6669246" y="4043493"/>
+            <a:off x="6575878" y="4043493"/>
             <a:ext cx="2002283" cy="523220"/>
           </a:xfrm>
           <a:prstGeom prst="rect">
@@ -4057,8 +4600,8 @@
         </p:nvSpPr>
         <p:spPr>
           <a:xfrm>
-            <a:off x="4202884" y="3075057"/>
-            <a:ext cx="3775046" cy="707886"/>
+            <a:off x="3530192" y="3077451"/>
+            <a:ext cx="5131616" cy="707886"/>
           </a:xfrm>
           <a:prstGeom prst="rect">
             <a:avLst/>
@@ -4073,9 +4616,10 @@
           <a:p>
             <a:pPr algn="ctr"/>
             <a:r>
-              <a:rPr lang="ko-KR" altLang="en-US" sz="4000" dirty="0"/>
-              <a:t>개발 배경</a:t>
-            </a:r>
+              <a:rPr lang="ko-KR" altLang="en-US" sz="4000"/>
+              <a:t>개발 배경 및 소개</a:t>
+            </a:r>
+            <a:endParaRPr lang="ko-KR" altLang="en-US" sz="4000" dirty="0"/>
           </a:p>
         </p:txBody>
       </p:sp>
@@ -4154,93 +4698,423 @@
       </p:grpSpPr>
       <p:sp>
         <p:nvSpPr>
-          <p:cNvPr id="2" name="TextBox 1">
-            <a:extLst>
-              <a:ext uri="{FF2B5EF4-FFF2-40B4-BE49-F238E27FC236}">
-                <a16:creationId xmlns:a16="http://schemas.microsoft.com/office/drawing/2014/main" id="{92A419A0-D317-496E-AD8C-06CFB3E6CE70}"/>
-              </a:ext>
-            </a:extLst>
-          </p:cNvPr>
-          <p:cNvSpPr txBox="1"/>
+          <p:cNvPr id="2" name="사각형: 둥근 모서리 1">
+            <a:extLst>
+              <a:ext uri="{FF2B5EF4-FFF2-40B4-BE49-F238E27FC236}">
+                <a16:creationId xmlns:a16="http://schemas.microsoft.com/office/drawing/2014/main" id="{374157EF-E6B4-4DC6-86FC-DCF49C607B84}"/>
+              </a:ext>
+            </a:extLst>
+          </p:cNvPr>
+          <p:cNvSpPr/>
           <p:nvPr/>
         </p:nvSpPr>
         <p:spPr>
           <a:xfrm>
-            <a:off x="254965" y="467247"/>
-            <a:ext cx="5841035" cy="369332"/>
+            <a:off x="2934789" y="505097"/>
+            <a:ext cx="6322422" cy="949234"/>
           </a:xfrm>
-          <a:prstGeom prst="rect">
+          <a:prstGeom prst="roundRect">
             <a:avLst/>
           </a:prstGeom>
-          <a:noFill/>
+          <a:solidFill>
+            <a:schemeClr val="accent1">
+              <a:lumMod val="75000"/>
+            </a:schemeClr>
+          </a:solidFill>
+          <a:effectLst>
+            <a:outerShdw blurRad="50800" dist="38100" dir="2700000" algn="tl" rotWithShape="0">
+              <a:prstClr val="black">
+                <a:alpha val="40000"/>
+              </a:prstClr>
+            </a:outerShdw>
+          </a:effectLst>
         </p:spPr>
-        <p:txBody>
-          <a:bodyPr wrap="square" rtlCol="0">
-            <a:spAutoFit/>
-          </a:bodyPr>
-          <a:lstStyle/>
-          <a:p>
+        <p:style>
+          <a:lnRef idx="2">
+            <a:schemeClr val="accent1">
+              <a:shade val="50000"/>
+            </a:schemeClr>
+          </a:lnRef>
+          <a:fillRef idx="1">
+            <a:schemeClr val="accent1"/>
+          </a:fillRef>
+          <a:effectRef idx="0">
+            <a:schemeClr val="accent1"/>
+          </a:effectRef>
+          <a:fontRef idx="minor">
+            <a:schemeClr val="lt1"/>
+          </a:fontRef>
+        </p:style>
+        <p:txBody>
+          <a:bodyPr rtlCol="0" anchor="ctr"/>
+          <a:lstStyle/>
+          <a:p>
+            <a:pPr algn="ctr"/>
             <a:r>
               <a:rPr lang="ko-KR" altLang="en-US" dirty="0"/>
-              <a:t>당뇨병</a:t>
-            </a:r>
-            <a:r>
-              <a:rPr lang="en-US" altLang="ko-KR" dirty="0"/>
-              <a:t> </a:t>
-            </a:r>
-            <a:r>
-              <a:rPr lang="ko-KR" altLang="en-US" dirty="0"/>
-              <a:t> </a:t>
-            </a:r>
-          </a:p>
-        </p:txBody>
-      </p:sp>
-      <p:sp>
-        <p:nvSpPr>
-          <p:cNvPr id="3" name="TextBox 2">
-            <a:extLst>
-              <a:ext uri="{FF2B5EF4-FFF2-40B4-BE49-F238E27FC236}">
-                <a16:creationId xmlns:a16="http://schemas.microsoft.com/office/drawing/2014/main" id="{7B96D056-8DE4-4468-8F22-FECBA4262995}"/>
-              </a:ext>
-            </a:extLst>
-          </p:cNvPr>
-          <p:cNvSpPr txBox="1"/>
+              <a:t>신체와 정신 건강의 통합적 관리 체계 필요</a:t>
+            </a:r>
+          </a:p>
+        </p:txBody>
+      </p:sp>
+      <p:sp>
+        <p:nvSpPr>
+          <p:cNvPr id="3" name="타원 2">
+            <a:extLst>
+              <a:ext uri="{FF2B5EF4-FFF2-40B4-BE49-F238E27FC236}">
+                <a16:creationId xmlns:a16="http://schemas.microsoft.com/office/drawing/2014/main" id="{B8FBAA27-C00F-40C0-ACDF-AEA0DB606678}"/>
+              </a:ext>
+            </a:extLst>
+          </p:cNvPr>
+          <p:cNvSpPr/>
           <p:nvPr/>
         </p:nvSpPr>
         <p:spPr>
           <a:xfrm>
-            <a:off x="632298" y="1050587"/>
-            <a:ext cx="10875523" cy="369332"/>
+            <a:off x="65170" y="4779371"/>
+            <a:ext cx="2802944" cy="1573532"/>
           </a:xfrm>
-          <a:prstGeom prst="rect">
+          <a:prstGeom prst="ellipse">
             <a:avLst/>
           </a:prstGeom>
-          <a:noFill/>
+          <a:solidFill>
+            <a:schemeClr val="bg1">
+              <a:lumMod val="50000"/>
+            </a:schemeClr>
+          </a:solidFill>
+          <a:ln w="28575">
+            <a:solidFill>
+              <a:schemeClr val="bg1"/>
+            </a:solidFill>
+          </a:ln>
+          <a:effectLst>
+            <a:outerShdw blurRad="50800" dist="38100" dir="2700000" algn="tl" rotWithShape="0">
+              <a:prstClr val="black">
+                <a:alpha val="40000"/>
+              </a:prstClr>
+            </a:outerShdw>
+          </a:effectLst>
         </p:spPr>
-        <p:txBody>
-          <a:bodyPr wrap="square" rtlCol="0">
-            <a:spAutoFit/>
-          </a:bodyPr>
-          <a:lstStyle/>
-          <a:p>
-            <a:r>
-              <a:rPr lang="ko-KR" altLang="en-US" dirty="0"/>
-              <a:t>높은 혈당 수치가 오랜 기간 지속되는 대사 </a:t>
-            </a:r>
-            <a:r>
-              <a:rPr lang="ko-KR" altLang="en-US" dirty="0" err="1"/>
-              <a:t>질환군</a:t>
-            </a:r>
-            <a:endParaRPr lang="ko-KR" altLang="en-US" dirty="0"/>
+        <p:style>
+          <a:lnRef idx="2">
+            <a:schemeClr val="accent1">
+              <a:shade val="50000"/>
+            </a:schemeClr>
+          </a:lnRef>
+          <a:fillRef idx="1">
+            <a:schemeClr val="accent1"/>
+          </a:fillRef>
+          <a:effectRef idx="0">
+            <a:schemeClr val="accent1"/>
+          </a:effectRef>
+          <a:fontRef idx="minor">
+            <a:schemeClr val="lt1"/>
+          </a:fontRef>
+        </p:style>
+        <p:txBody>
+          <a:bodyPr rtlCol="0" anchor="ctr"/>
+          <a:lstStyle/>
+          <a:p>
+            <a:pPr algn="ctr"/>
+            <a:r>
+              <a:rPr lang="ko-KR" altLang="en-US" sz="1500" dirty="0"/>
+              <a:t>당뇨병 유병률</a:t>
+            </a:r>
+            <a:br>
+              <a:rPr lang="en-US" altLang="ko-KR" sz="1500" dirty="0"/>
+            </a:br>
+            <a:r>
+              <a:rPr lang="ko-KR" altLang="en-US" sz="1500" dirty="0"/>
+              <a:t> 증가</a:t>
+            </a:r>
+          </a:p>
+        </p:txBody>
+      </p:sp>
+      <p:sp>
+        <p:nvSpPr>
+          <p:cNvPr id="7" name="타원 6">
+            <a:extLst>
+              <a:ext uri="{FF2B5EF4-FFF2-40B4-BE49-F238E27FC236}">
+                <a16:creationId xmlns:a16="http://schemas.microsoft.com/office/drawing/2014/main" id="{61D3452C-24D8-47E2-8593-400951CDE04F}"/>
+              </a:ext>
+            </a:extLst>
+          </p:cNvPr>
+          <p:cNvSpPr/>
+          <p:nvPr/>
+        </p:nvSpPr>
+        <p:spPr>
+          <a:xfrm>
+            <a:off x="3129403" y="4779371"/>
+            <a:ext cx="2802944" cy="1573532"/>
+          </a:xfrm>
+          <a:prstGeom prst="ellipse">
+            <a:avLst/>
+          </a:prstGeom>
+          <a:solidFill>
+            <a:schemeClr val="bg1">
+              <a:lumMod val="50000"/>
+            </a:schemeClr>
+          </a:solidFill>
+          <a:ln w="28575">
+            <a:solidFill>
+              <a:schemeClr val="bg1"/>
+            </a:solidFill>
+          </a:ln>
+          <a:effectLst>
+            <a:outerShdw blurRad="50800" dist="38100" dir="2700000" algn="tl" rotWithShape="0">
+              <a:prstClr val="black">
+                <a:alpha val="40000"/>
+              </a:prstClr>
+            </a:outerShdw>
+          </a:effectLst>
+        </p:spPr>
+        <p:style>
+          <a:lnRef idx="2">
+            <a:schemeClr val="accent1">
+              <a:shade val="50000"/>
+            </a:schemeClr>
+          </a:lnRef>
+          <a:fillRef idx="1">
+            <a:schemeClr val="accent1"/>
+          </a:fillRef>
+          <a:effectRef idx="0">
+            <a:schemeClr val="accent1"/>
+          </a:effectRef>
+          <a:fontRef idx="minor">
+            <a:schemeClr val="lt1"/>
+          </a:fontRef>
+        </p:style>
+        <p:txBody>
+          <a:bodyPr rtlCol="0" anchor="ctr"/>
+          <a:lstStyle/>
+          <a:p>
+            <a:pPr algn="ctr"/>
+            <a:r>
+              <a:rPr lang="ko-KR" altLang="en-US" sz="1500" dirty="0"/>
+              <a:t>지속적 라이프스타일 관리의 필요성</a:t>
+            </a:r>
+          </a:p>
+        </p:txBody>
+      </p:sp>
+      <p:sp>
+        <p:nvSpPr>
+          <p:cNvPr id="8" name="타원 7">
+            <a:extLst>
+              <a:ext uri="{FF2B5EF4-FFF2-40B4-BE49-F238E27FC236}">
+                <a16:creationId xmlns:a16="http://schemas.microsoft.com/office/drawing/2014/main" id="{4BBD491B-8070-45CE-80E5-75AFA1AE9C87}"/>
+              </a:ext>
+            </a:extLst>
+          </p:cNvPr>
+          <p:cNvSpPr/>
+          <p:nvPr/>
+        </p:nvSpPr>
+        <p:spPr>
+          <a:xfrm>
+            <a:off x="6193636" y="4779371"/>
+            <a:ext cx="2802944" cy="1573532"/>
+          </a:xfrm>
+          <a:prstGeom prst="ellipse">
+            <a:avLst/>
+          </a:prstGeom>
+          <a:solidFill>
+            <a:schemeClr val="bg1">
+              <a:lumMod val="50000"/>
+            </a:schemeClr>
+          </a:solidFill>
+          <a:ln w="28575">
+            <a:solidFill>
+              <a:schemeClr val="bg1"/>
+            </a:solidFill>
+          </a:ln>
+          <a:effectLst>
+            <a:outerShdw blurRad="50800" dist="38100" dir="2700000" algn="tl" rotWithShape="0">
+              <a:prstClr val="black">
+                <a:alpha val="40000"/>
+              </a:prstClr>
+            </a:outerShdw>
+          </a:effectLst>
+        </p:spPr>
+        <p:style>
+          <a:lnRef idx="2">
+            <a:schemeClr val="accent1">
+              <a:shade val="50000"/>
+            </a:schemeClr>
+          </a:lnRef>
+          <a:fillRef idx="1">
+            <a:schemeClr val="accent1"/>
+          </a:fillRef>
+          <a:effectRef idx="0">
+            <a:schemeClr val="accent1"/>
+          </a:effectRef>
+          <a:fontRef idx="minor">
+            <a:schemeClr val="lt1"/>
+          </a:fontRef>
+        </p:style>
+        <p:txBody>
+          <a:bodyPr rtlCol="0" anchor="ctr"/>
+          <a:lstStyle/>
+          <a:p>
+            <a:pPr algn="ctr"/>
+            <a:r>
+              <a:rPr lang="ko-KR" altLang="en-US" sz="1500"/>
+              <a:t>당뇨병과 우울증 간 인과 관계</a:t>
+            </a:r>
+            <a:endParaRPr lang="ko-KR" altLang="en-US" sz="1500" dirty="0"/>
+          </a:p>
+        </p:txBody>
+      </p:sp>
+      <p:sp>
+        <p:nvSpPr>
+          <p:cNvPr id="9" name="타원 8">
+            <a:extLst>
+              <a:ext uri="{FF2B5EF4-FFF2-40B4-BE49-F238E27FC236}">
+                <a16:creationId xmlns:a16="http://schemas.microsoft.com/office/drawing/2014/main" id="{337D31F6-6203-47B8-B58F-855E1AB2E8E8}"/>
+              </a:ext>
+            </a:extLst>
+          </p:cNvPr>
+          <p:cNvSpPr/>
+          <p:nvPr/>
+        </p:nvSpPr>
+        <p:spPr>
+          <a:xfrm>
+            <a:off x="9257868" y="4779371"/>
+            <a:ext cx="2802944" cy="1573532"/>
+          </a:xfrm>
+          <a:prstGeom prst="ellipse">
+            <a:avLst/>
+          </a:prstGeom>
+          <a:solidFill>
+            <a:schemeClr val="bg1">
+              <a:lumMod val="50000"/>
+            </a:schemeClr>
+          </a:solidFill>
+          <a:ln w="28575">
+            <a:solidFill>
+              <a:schemeClr val="bg1"/>
+            </a:solidFill>
+          </a:ln>
+          <a:effectLst>
+            <a:outerShdw blurRad="50800" dist="38100" dir="2700000" algn="tl" rotWithShape="0">
+              <a:prstClr val="black">
+                <a:alpha val="40000"/>
+              </a:prstClr>
+            </a:outerShdw>
+          </a:effectLst>
+        </p:spPr>
+        <p:style>
+          <a:lnRef idx="2">
+            <a:schemeClr val="accent1">
+              <a:shade val="50000"/>
+            </a:schemeClr>
+          </a:lnRef>
+          <a:fillRef idx="1">
+            <a:schemeClr val="accent1"/>
+          </a:fillRef>
+          <a:effectRef idx="0">
+            <a:schemeClr val="accent1"/>
+          </a:effectRef>
+          <a:fontRef idx="minor">
+            <a:schemeClr val="lt1"/>
+          </a:fontRef>
+        </p:style>
+        <p:txBody>
+          <a:bodyPr rtlCol="0" anchor="ctr"/>
+          <a:lstStyle/>
+          <a:p>
+            <a:pPr algn="ctr"/>
+            <a:r>
+              <a:rPr lang="ko-KR" altLang="en-US" sz="1500" dirty="0"/>
+              <a:t>기존 어플리케이션의 한계</a:t>
+            </a:r>
+          </a:p>
+        </p:txBody>
+      </p:sp>
+      <p:sp>
+        <p:nvSpPr>
+          <p:cNvPr id="10" name="화살표: 위쪽 9">
+            <a:extLst>
+              <a:ext uri="{FF2B5EF4-FFF2-40B4-BE49-F238E27FC236}">
+                <a16:creationId xmlns:a16="http://schemas.microsoft.com/office/drawing/2014/main" id="{B5F72FF9-DD2E-483F-A9A0-D46D3297EA3D}"/>
+              </a:ext>
+            </a:extLst>
+          </p:cNvPr>
+          <p:cNvSpPr/>
+          <p:nvPr/>
+        </p:nvSpPr>
+        <p:spPr>
+          <a:xfrm>
+            <a:off x="2571518" y="1646397"/>
+            <a:ext cx="6721657" cy="2841987"/>
+          </a:xfrm>
+          <a:prstGeom prst="upArrow">
+            <a:avLst/>
+          </a:prstGeom>
+          <a:gradFill flip="none" rotWithShape="1">
+            <a:gsLst>
+              <a:gs pos="0">
+                <a:schemeClr val="bg1">
+                  <a:lumMod val="75000"/>
+                  <a:shade val="30000"/>
+                  <a:satMod val="115000"/>
+                </a:schemeClr>
+              </a:gs>
+              <a:gs pos="50000">
+                <a:schemeClr val="bg1">
+                  <a:lumMod val="75000"/>
+                  <a:shade val="67500"/>
+                  <a:satMod val="115000"/>
+                </a:schemeClr>
+              </a:gs>
+              <a:gs pos="100000">
+                <a:schemeClr val="bg1">
+                  <a:lumMod val="75000"/>
+                  <a:shade val="100000"/>
+                  <a:satMod val="115000"/>
+                </a:schemeClr>
+              </a:gs>
+            </a:gsLst>
+            <a:lin ang="5400000" scaled="1"/>
+            <a:tileRect/>
+          </a:gradFill>
+          <a:ln>
+            <a:solidFill>
+              <a:schemeClr val="bg1">
+                <a:lumMod val="75000"/>
+              </a:schemeClr>
+            </a:solidFill>
+          </a:ln>
+        </p:spPr>
+        <p:style>
+          <a:lnRef idx="2">
+            <a:schemeClr val="accent1">
+              <a:shade val="50000"/>
+            </a:schemeClr>
+          </a:lnRef>
+          <a:fillRef idx="1">
+            <a:schemeClr val="accent1"/>
+          </a:fillRef>
+          <a:effectRef idx="0">
+            <a:schemeClr val="accent1"/>
+          </a:effectRef>
+          <a:fontRef idx="minor">
+            <a:schemeClr val="lt1"/>
+          </a:fontRef>
+        </p:style>
+        <p:txBody>
+          <a:bodyPr rtlCol="0" anchor="ctr"/>
+          <a:lstStyle/>
+          <a:p>
+            <a:pPr algn="ctr"/>
+            <a:endParaRPr lang="ko-KR" altLang="en-US"/>
           </a:p>
         </p:txBody>
       </p:sp>
       <p:pic>
         <p:nvPicPr>
-          <p:cNvPr id="1026" name="Picture 2" descr="ë¹ë¨ë³ íìì ì¶ì´ì ëí ì´ë¯¸ì§ ê²ìê²°ê³¼">
-            <a:extLst>
-              <a:ext uri="{FF2B5EF4-FFF2-40B4-BE49-F238E27FC236}">
-                <a16:creationId xmlns:a16="http://schemas.microsoft.com/office/drawing/2014/main" id="{80F23F34-9A00-4C60-B281-A5ACA7E34F50}"/>
+          <p:cNvPr id="1026" name="Picture 2" descr="ê°ë° ë°°ê²½ì ëí ì´ë¯¸ì§ ê²ìê²°ê³¼">
+            <a:extLst>
+              <a:ext uri="{FF2B5EF4-FFF2-40B4-BE49-F238E27FC236}">
+                <a16:creationId xmlns:a16="http://schemas.microsoft.com/office/drawing/2014/main" id="{D6630E3D-E204-441D-9B76-386A1B94CAA8}"/>
               </a:ext>
             </a:extLst>
           </p:cNvPr>
@@ -4250,7 +5124,7 @@
           <p:nvPr/>
         </p:nvPicPr>
         <p:blipFill>
-          <a:blip r:embed="rId2">
+          <a:blip r:embed="rId3">
             <a:extLst>
               <a:ext uri="{28A0092B-C50C-407E-A947-70E740481C1C}">
                 <a14:useLocalDpi xmlns:a14="http://schemas.microsoft.com/office/drawing/2010/main" val="0"/>
@@ -4264,8 +5138,8 @@
         </p:blipFill>
         <p:spPr bwMode="auto">
           <a:xfrm>
-            <a:off x="1299426" y="2120082"/>
-            <a:ext cx="4232487" cy="3414206"/>
+            <a:off x="177460" y="2078627"/>
+            <a:ext cx="5442729" cy="1977525"/>
           </a:xfrm>
           <a:prstGeom prst="rect">
             <a:avLst/>
@@ -4284,10 +5158,10 @@
       </p:pic>
       <p:sp>
         <p:nvSpPr>
-          <p:cNvPr id="4" name="TextBox 3">
-            <a:extLst>
-              <a:ext uri="{FF2B5EF4-FFF2-40B4-BE49-F238E27FC236}">
-                <a16:creationId xmlns:a16="http://schemas.microsoft.com/office/drawing/2014/main" id="{33BFCA7D-D1A3-4093-8445-D0C44F05BC50}"/>
+          <p:cNvPr id="11" name="TextBox 10">
+            <a:extLst>
+              <a:ext uri="{FF2B5EF4-FFF2-40B4-BE49-F238E27FC236}">
+                <a16:creationId xmlns:a16="http://schemas.microsoft.com/office/drawing/2014/main" id="{333BE0B8-9FAC-4DA9-A6A1-E00001869C8E}"/>
               </a:ext>
             </a:extLst>
           </p:cNvPr>
@@ -4296,8 +5170,8 @@
         </p:nvSpPr>
         <p:spPr>
           <a:xfrm>
-            <a:off x="2471523" y="5807413"/>
-            <a:ext cx="3599234" cy="369332"/>
+            <a:off x="4343400" y="2733675"/>
+            <a:ext cx="3143250" cy="923330"/>
           </a:xfrm>
           <a:prstGeom prst="rect">
             <a:avLst/>
@@ -4310,145 +5184,43 @@
           </a:bodyPr>
           <a:lstStyle/>
           <a:p>
-            <a:r>
-              <a:rPr lang="ko-KR" altLang="en-US" dirty="0"/>
-              <a:t>출처 </a:t>
-            </a:r>
-            <a:r>
-              <a:rPr lang="en-US" altLang="ko-KR" dirty="0"/>
-              <a:t>: </a:t>
-            </a:r>
-            <a:r>
-              <a:rPr lang="ko-KR" altLang="en-US" dirty="0"/>
-              <a:t>조선일보</a:t>
-            </a:r>
-          </a:p>
-        </p:txBody>
-      </p:sp>
-      <p:pic>
-        <p:nvPicPr>
-          <p:cNvPr id="12" name="그림 11">
-            <a:extLst>
-              <a:ext uri="{FF2B5EF4-FFF2-40B4-BE49-F238E27FC236}">
-                <a16:creationId xmlns:a16="http://schemas.microsoft.com/office/drawing/2014/main" id="{930E52F5-C2C3-4EF0-9AED-D3A82A2F9894}"/>
-              </a:ext>
-            </a:extLst>
-          </p:cNvPr>
-          <p:cNvPicPr>
-            <a:picLocks noChangeAspect="1"/>
-          </p:cNvPicPr>
-          <p:nvPr/>
-        </p:nvPicPr>
-        <p:blipFill>
-          <a:blip r:embed="rId3"/>
-          <a:stretch>
-            <a:fillRect/>
-          </a:stretch>
-        </p:blipFill>
-        <p:spPr>
-          <a:xfrm>
-            <a:off x="7032288" y="2110844"/>
-            <a:ext cx="1600200" cy="1657350"/>
-          </a:xfrm>
-          <a:prstGeom prst="rect">
-            <a:avLst/>
-          </a:prstGeom>
-        </p:spPr>
-      </p:pic>
-      <p:pic>
-        <p:nvPicPr>
-          <p:cNvPr id="13" name="그림 12">
-            <a:extLst>
-              <a:ext uri="{FF2B5EF4-FFF2-40B4-BE49-F238E27FC236}">
-                <a16:creationId xmlns:a16="http://schemas.microsoft.com/office/drawing/2014/main" id="{3608C1F3-88E1-4995-BA93-ACCBECFD5D66}"/>
-              </a:ext>
-            </a:extLst>
-          </p:cNvPr>
-          <p:cNvPicPr>
-            <a:picLocks noChangeAspect="1"/>
-          </p:cNvPicPr>
-          <p:nvPr/>
-        </p:nvPicPr>
-        <p:blipFill>
-          <a:blip r:embed="rId4"/>
-          <a:stretch>
-            <a:fillRect/>
-          </a:stretch>
-        </p:blipFill>
-        <p:spPr>
-          <a:xfrm>
-            <a:off x="8859872" y="2110843"/>
-            <a:ext cx="1636370" cy="1657349"/>
-          </a:xfrm>
-          <a:prstGeom prst="rect">
-            <a:avLst/>
-          </a:prstGeom>
-        </p:spPr>
-      </p:pic>
-      <p:pic>
-        <p:nvPicPr>
-          <p:cNvPr id="14" name="그림 13">
-            <a:extLst>
-              <a:ext uri="{FF2B5EF4-FFF2-40B4-BE49-F238E27FC236}">
-                <a16:creationId xmlns:a16="http://schemas.microsoft.com/office/drawing/2014/main" id="{A3D53F51-1F0A-4E2F-8EA6-2ECE59F7E968}"/>
-              </a:ext>
-            </a:extLst>
-          </p:cNvPr>
-          <p:cNvPicPr>
-            <a:picLocks noChangeAspect="1"/>
-          </p:cNvPicPr>
-          <p:nvPr/>
-        </p:nvPicPr>
-        <p:blipFill>
-          <a:blip r:embed="rId5"/>
-          <a:stretch>
-            <a:fillRect/>
-          </a:stretch>
-        </p:blipFill>
-        <p:spPr>
-          <a:xfrm>
-            <a:off x="8859872" y="3964280"/>
-            <a:ext cx="1636370" cy="1570008"/>
-          </a:xfrm>
-          <a:prstGeom prst="rect">
-            <a:avLst/>
-          </a:prstGeom>
-        </p:spPr>
-      </p:pic>
-      <p:pic>
-        <p:nvPicPr>
-          <p:cNvPr id="15" name="그림 14">
-            <a:extLst>
-              <a:ext uri="{FF2B5EF4-FFF2-40B4-BE49-F238E27FC236}">
-                <a16:creationId xmlns:a16="http://schemas.microsoft.com/office/drawing/2014/main" id="{0328D05E-7376-4543-810B-22E0DABFA5E6}"/>
-              </a:ext>
-            </a:extLst>
-          </p:cNvPr>
-          <p:cNvPicPr>
-            <a:picLocks noChangeAspect="1"/>
-          </p:cNvPicPr>
-          <p:nvPr/>
-        </p:nvPicPr>
-        <p:blipFill>
-          <a:blip r:embed="rId6"/>
-          <a:stretch>
-            <a:fillRect/>
-          </a:stretch>
-        </p:blipFill>
-        <p:spPr>
-          <a:xfrm>
-            <a:off x="7032288" y="3987675"/>
-            <a:ext cx="1600200" cy="1570008"/>
-          </a:xfrm>
-          <a:prstGeom prst="rect">
-            <a:avLst/>
-          </a:prstGeom>
-        </p:spPr>
-      </p:pic>
+            <a:pPr algn="ctr"/>
+            <a:r>
+              <a:rPr lang="ko-KR" altLang="en-US" dirty="0">
+                <a:solidFill>
+                  <a:schemeClr val="bg1">
+                    <a:lumMod val="95000"/>
+                  </a:schemeClr>
+                </a:solidFill>
+              </a:rPr>
+              <a:t>당뇨병과 동반되는 우울증을 관리할 수 있는 도구의</a:t>
+            </a:r>
+            <a:br>
+              <a:rPr lang="en-US" altLang="ko-KR" dirty="0">
+                <a:solidFill>
+                  <a:schemeClr val="bg1">
+                    <a:lumMod val="95000"/>
+                  </a:schemeClr>
+                </a:solidFill>
+              </a:rPr>
+            </a:br>
+            <a:r>
+              <a:rPr lang="ko-KR" altLang="en-US" dirty="0">
+                <a:solidFill>
+                  <a:schemeClr val="bg1">
+                    <a:lumMod val="95000"/>
+                  </a:schemeClr>
+                </a:solidFill>
+              </a:rPr>
+              <a:t> 필요성 대두</a:t>
+            </a:r>
+          </a:p>
+        </p:txBody>
+      </p:sp>
     </p:spTree>
     <p:extLst>
       <p:ext uri="{BB962C8B-B14F-4D97-AF65-F5344CB8AC3E}">
-        <p14:creationId xmlns:p14="http://schemas.microsoft.com/office/powerpoint/2010/main" val="447719142"/>
+        <p14:creationId xmlns:p14="http://schemas.microsoft.com/office/powerpoint/2010/main" val="96488428"/>
       </p:ext>
     </p:extLst>
   </p:cSld>
@@ -4480,7 +5252,7 @@
           <p:cNvPr id="2" name="TextBox 1">
             <a:extLst>
               <a:ext uri="{FF2B5EF4-FFF2-40B4-BE49-F238E27FC236}">
-                <a16:creationId xmlns:a16="http://schemas.microsoft.com/office/drawing/2014/main" id="{C0D202E1-1249-4075-8D26-80296FD0C906}"/>
+                <a16:creationId xmlns:a16="http://schemas.microsoft.com/office/drawing/2014/main" id="{92A419A0-D317-496E-AD8C-06CFB3E6CE70}"/>
               </a:ext>
             </a:extLst>
           </p:cNvPr>
@@ -4489,8 +5261,8 @@
         </p:nvSpPr>
         <p:spPr>
           <a:xfrm>
-            <a:off x="688926" y="732006"/>
-            <a:ext cx="6984460" cy="369332"/>
+            <a:off x="254965" y="188098"/>
+            <a:ext cx="11584610" cy="523220"/>
           </a:xfrm>
           <a:prstGeom prst="rect">
             <a:avLst/>
@@ -4504,18 +5276,18 @@
           <a:lstStyle/>
           <a:p>
             <a:r>
-              <a:rPr lang="ko-KR" altLang="en-US" dirty="0"/>
-              <a:t>당뇨병과 우울증의 상관관계</a:t>
+              <a:rPr lang="ko-KR" altLang="en-US" sz="2800" dirty="0"/>
+              <a:t>인지행동치료</a:t>
             </a:r>
           </a:p>
         </p:txBody>
       </p:sp>
       <p:pic>
         <p:nvPicPr>
-          <p:cNvPr id="3074" name="Picture 2" descr="diabetes depressionì ëí ì´ë¯¸ì§ ê²ìê²°ê³¼">
-            <a:extLst>
-              <a:ext uri="{FF2B5EF4-FFF2-40B4-BE49-F238E27FC236}">
-                <a16:creationId xmlns:a16="http://schemas.microsoft.com/office/drawing/2014/main" id="{2ACA0DE2-3CE1-4B9E-A4C1-AAC74ED843CF}"/>
+          <p:cNvPr id="2050" name="Picture 2" descr="cognitive triangleì ëí ì´ë¯¸ì§ ê²ìê²°ê³¼">
+            <a:extLst>
+              <a:ext uri="{FF2B5EF4-FFF2-40B4-BE49-F238E27FC236}">
+                <a16:creationId xmlns:a16="http://schemas.microsoft.com/office/drawing/2014/main" id="{96716DEE-8641-46CA-AEED-17EF63D159A4}"/>
               </a:ext>
             </a:extLst>
           </p:cNvPr>
@@ -4525,7 +5297,7 @@
           <p:nvPr/>
         </p:nvPicPr>
         <p:blipFill>
-          <a:blip r:embed="rId2">
+          <a:blip r:embed="rId3">
             <a:extLst>
               <a:ext uri="{28A0092B-C50C-407E-A947-70E740481C1C}">
                 <a14:useLocalDpi xmlns:a14="http://schemas.microsoft.com/office/drawing/2010/main" val="0"/>
@@ -4539,85 +5311,8 @@
         </p:blipFill>
         <p:spPr bwMode="auto">
           <a:xfrm>
-            <a:off x="3516085" y="2506494"/>
-            <a:ext cx="5715000" cy="3619500"/>
-          </a:xfrm>
-          <a:prstGeom prst="rect">
-            <a:avLst/>
-          </a:prstGeom>
-          <a:noFill/>
-          <a:extLst>
-            <a:ext uri="{909E8E84-426E-40DD-AFC4-6F175D3DCCD1}">
-              <a14:hiddenFill xmlns:a14="http://schemas.microsoft.com/office/drawing/2010/main">
-                <a:solidFill>
-                  <a:srgbClr val="FFFFFF"/>
-                </a:solidFill>
-              </a14:hiddenFill>
-            </a:ext>
-          </a:extLst>
-        </p:spPr>
-      </p:pic>
-    </p:spTree>
-    <p:extLst>
-      <p:ext uri="{BB962C8B-B14F-4D97-AF65-F5344CB8AC3E}">
-        <p14:creationId xmlns:p14="http://schemas.microsoft.com/office/powerpoint/2010/main" val="3353818767"/>
-      </p:ext>
-    </p:extLst>
-  </p:cSld>
-  <p:clrMapOvr>
-    <a:masterClrMapping/>
-  </p:clrMapOvr>
-</p:sld>
-</file>
-
-<file path=ppt/slides/slide6.xml><?xml version="1.0" encoding="utf-8"?>
-<p:sld xmlns:a="http://schemas.openxmlformats.org/drawingml/2006/main" xmlns:r="http://schemas.openxmlformats.org/officeDocument/2006/relationships" xmlns:p="http://schemas.openxmlformats.org/presentationml/2006/main">
-  <p:cSld>
-    <p:spTree>
-      <p:nvGrpSpPr>
-        <p:cNvPr id="1" name=""/>
-        <p:cNvGrpSpPr/>
-        <p:nvPr/>
-      </p:nvGrpSpPr>
-      <p:grpSpPr>
-        <a:xfrm>
-          <a:off x="0" y="0"/>
-          <a:ext cx="0" cy="0"/>
-          <a:chOff x="0" y="0"/>
-          <a:chExt cx="0" cy="0"/>
-        </a:xfrm>
-      </p:grpSpPr>
-      <p:pic>
-        <p:nvPicPr>
-          <p:cNvPr id="2050" name="Picture 2" descr="ë¥í°ë¤ì´ì´ë¦¬ì ëí ì´ë¯¸ì§ ê²ìê²°ê³¼">
-            <a:extLst>
-              <a:ext uri="{FF2B5EF4-FFF2-40B4-BE49-F238E27FC236}">
-                <a16:creationId xmlns:a16="http://schemas.microsoft.com/office/drawing/2014/main" id="{0AA454D9-0D96-4208-A0F2-E1AF759222A3}"/>
-              </a:ext>
-            </a:extLst>
-          </p:cNvPr>
-          <p:cNvPicPr>
-            <a:picLocks noChangeAspect="1" noChangeArrowheads="1"/>
-          </p:cNvPicPr>
-          <p:nvPr/>
-        </p:nvPicPr>
-        <p:blipFill>
-          <a:blip r:embed="rId2">
-            <a:extLst>
-              <a:ext uri="{28A0092B-C50C-407E-A947-70E740481C1C}">
-                <a14:useLocalDpi xmlns:a14="http://schemas.microsoft.com/office/drawing/2010/main" val="0"/>
-              </a:ext>
-            </a:extLst>
-          </a:blip>
-          <a:srcRect/>
-          <a:stretch>
-            <a:fillRect/>
-          </a:stretch>
-        </p:blipFill>
-        <p:spPr bwMode="auto">
-          <a:xfrm>
-            <a:off x="407657" y="2287554"/>
-            <a:ext cx="7391877" cy="2282892"/>
+            <a:off x="359740" y="2179924"/>
+            <a:ext cx="5517185" cy="2936392"/>
           </a:xfrm>
           <a:prstGeom prst="rect">
             <a:avLst/>
@@ -4636,38 +5331,90 @@
       </p:pic>
       <p:pic>
         <p:nvPicPr>
-          <p:cNvPr id="8" name="그림 7">
-            <a:extLst>
-              <a:ext uri="{FF2B5EF4-FFF2-40B4-BE49-F238E27FC236}">
-                <a16:creationId xmlns:a16="http://schemas.microsoft.com/office/drawing/2014/main" id="{14609132-3EAA-43B9-9B59-136DB4402D2D}"/>
+          <p:cNvPr id="6" name="Picture 2" descr="https://upload.wikimedia.org/wikipedia/commons/thumb/d/d0/Common_Cognitive_Biases.png/400px-Common_Cognitive_Biases.png">
+            <a:extLst>
+              <a:ext uri="{FF2B5EF4-FFF2-40B4-BE49-F238E27FC236}">
+                <a16:creationId xmlns:a16="http://schemas.microsoft.com/office/drawing/2014/main" id="{110E303E-4F06-4EC3-8049-A87363915A99}"/>
               </a:ext>
             </a:extLst>
           </p:cNvPr>
           <p:cNvPicPr>
-            <a:picLocks noChangeAspect="1"/>
+            <a:picLocks noChangeAspect="1" noChangeArrowheads="1"/>
           </p:cNvPicPr>
           <p:nvPr/>
         </p:nvPicPr>
         <p:blipFill>
-          <a:blip r:embed="rId3"/>
+          <a:blip r:embed="rId4">
+            <a:extLst>
+              <a:ext uri="{28A0092B-C50C-407E-A947-70E740481C1C}">
+                <a14:useLocalDpi xmlns:a14="http://schemas.microsoft.com/office/drawing/2010/main" val="0"/>
+              </a:ext>
+            </a:extLst>
+          </a:blip>
+          <a:srcRect/>
           <a:stretch>
             <a:fillRect/>
           </a:stretch>
         </p:blipFill>
-        <p:spPr>
+        <p:spPr bwMode="auto">
           <a:xfrm>
-            <a:off x="8450065" y="1991839"/>
-            <a:ext cx="2874321" cy="2874321"/>
+            <a:off x="6549887" y="1638345"/>
+            <a:ext cx="5120448" cy="4019551"/>
           </a:xfrm>
           <a:prstGeom prst="rect">
             <a:avLst/>
           </a:prstGeom>
+          <a:noFill/>
+          <a:extLst>
+            <a:ext uri="{909E8E84-426E-40DD-AFC4-6F175D3DCCD1}">
+              <a14:hiddenFill xmlns:a14="http://schemas.microsoft.com/office/drawing/2010/main">
+                <a:solidFill>
+                  <a:srgbClr val="FFFFFF"/>
+                </a:solidFill>
+              </a14:hiddenFill>
+            </a:ext>
+          </a:extLst>
         </p:spPr>
       </p:pic>
+      <p:sp>
+        <p:nvSpPr>
+          <p:cNvPr id="7" name="TextBox 6">
+            <a:extLst>
+              <a:ext uri="{FF2B5EF4-FFF2-40B4-BE49-F238E27FC236}">
+                <a16:creationId xmlns:a16="http://schemas.microsoft.com/office/drawing/2014/main" id="{E0A2CCBC-B43D-4649-A7AD-76BD4DB702C8}"/>
+              </a:ext>
+            </a:extLst>
+          </p:cNvPr>
+          <p:cNvSpPr txBox="1"/>
+          <p:nvPr/>
+        </p:nvSpPr>
+        <p:spPr>
+          <a:xfrm>
+            <a:off x="6549887" y="5745917"/>
+            <a:ext cx="4619625" cy="400110"/>
+          </a:xfrm>
+          <a:prstGeom prst="rect">
+            <a:avLst/>
+          </a:prstGeom>
+          <a:noFill/>
+        </p:spPr>
+        <p:txBody>
+          <a:bodyPr wrap="square" rtlCol="0">
+            <a:spAutoFit/>
+          </a:bodyPr>
+          <a:lstStyle/>
+          <a:p>
+            <a:r>
+              <a:rPr lang="ko-KR" altLang="en-US" sz="2000" dirty="0"/>
+              <a:t>우울증 환자의 대표적인 인지 왜곡</a:t>
+            </a:r>
+          </a:p>
+        </p:txBody>
+      </p:sp>
     </p:spTree>
     <p:extLst>
       <p:ext uri="{BB962C8B-B14F-4D97-AF65-F5344CB8AC3E}">
-        <p14:creationId xmlns:p14="http://schemas.microsoft.com/office/powerpoint/2010/main" val="1836980918"/>
+        <p14:creationId xmlns:p14="http://schemas.microsoft.com/office/powerpoint/2010/main" val="4066332501"/>
       </p:ext>
     </p:extLst>
   </p:cSld>
@@ -4677,7 +5424,7 @@
 </p:sld>
 </file>
 
-<file path=ppt/slides/slide7.xml><?xml version="1.0" encoding="utf-8"?>
+<file path=ppt/slides/slide6.xml><?xml version="1.0" encoding="utf-8"?>
 <p:sld xmlns:a="http://schemas.openxmlformats.org/drawingml/2006/main" xmlns:r="http://schemas.openxmlformats.org/officeDocument/2006/relationships" xmlns:p="http://schemas.openxmlformats.org/presentationml/2006/main">
   <p:cSld>
     <p:spTree>
@@ -4786,7 +5533,7 @@
 </p:sld>
 </file>
 
-<file path=ppt/slides/slide8.xml><?xml version="1.0" encoding="utf-8"?>
+<file path=ppt/slides/slide7.xml><?xml version="1.0" encoding="utf-8"?>
 <p:sld xmlns:a="http://schemas.openxmlformats.org/drawingml/2006/main" xmlns:r="http://schemas.openxmlformats.org/officeDocument/2006/relationships" xmlns:p="http://schemas.openxmlformats.org/presentationml/2006/main">
   <p:cSld>
     <p:spTree>
@@ -4852,7 +5599,7 @@
 </p:sld>
 </file>
 
-<file path=ppt/slides/slide9.xml><?xml version="1.0" encoding="utf-8"?>
+<file path=ppt/slides/slide8.xml><?xml version="1.0" encoding="utf-8"?>
 <p:sld xmlns:a="http://schemas.openxmlformats.org/drawingml/2006/main" xmlns:r="http://schemas.openxmlformats.org/officeDocument/2006/relationships" xmlns:p="http://schemas.openxmlformats.org/presentationml/2006/main">
   <p:cSld>
     <p:spTree>
@@ -4952,6 +5699,207 @@
     <p:extLst>
       <p:ext uri="{BB962C8B-B14F-4D97-AF65-F5344CB8AC3E}">
         <p14:creationId xmlns:p14="http://schemas.microsoft.com/office/powerpoint/2010/main" val="3793851783"/>
+      </p:ext>
+    </p:extLst>
+  </p:cSld>
+  <p:clrMapOvr>
+    <a:masterClrMapping/>
+  </p:clrMapOvr>
+</p:sld>
+</file>
+
+<file path=ppt/slides/slide9.xml><?xml version="1.0" encoding="utf-8"?>
+<p:sld xmlns:a="http://schemas.openxmlformats.org/drawingml/2006/main" xmlns:r="http://schemas.openxmlformats.org/officeDocument/2006/relationships" xmlns:p="http://schemas.openxmlformats.org/presentationml/2006/main">
+  <p:cSld>
+    <p:spTree>
+      <p:nvGrpSpPr>
+        <p:cNvPr id="1" name=""/>
+        <p:cNvGrpSpPr/>
+        <p:nvPr/>
+      </p:nvGrpSpPr>
+      <p:grpSpPr>
+        <a:xfrm>
+          <a:off x="0" y="0"/>
+          <a:ext cx="0" cy="0"/>
+          <a:chOff x="0" y="0"/>
+          <a:chExt cx="0" cy="0"/>
+        </a:xfrm>
+      </p:grpSpPr>
+      <p:sp>
+        <p:nvSpPr>
+          <p:cNvPr id="3" name="TextBox 2">
+            <a:extLst>
+              <a:ext uri="{FF2B5EF4-FFF2-40B4-BE49-F238E27FC236}">
+                <a16:creationId xmlns:a16="http://schemas.microsoft.com/office/drawing/2014/main" id="{C7AA742C-ED08-4B59-8545-43A9213CE802}"/>
+              </a:ext>
+            </a:extLst>
+          </p:cNvPr>
+          <p:cNvSpPr txBox="1"/>
+          <p:nvPr/>
+        </p:nvSpPr>
+        <p:spPr>
+          <a:xfrm>
+            <a:off x="637564" y="566678"/>
+            <a:ext cx="11232858" cy="2862322"/>
+          </a:xfrm>
+          <a:prstGeom prst="rect">
+            <a:avLst/>
+          </a:prstGeom>
+          <a:noFill/>
+        </p:spPr>
+        <p:txBody>
+          <a:bodyPr wrap="square" rtlCol="0">
+            <a:spAutoFit/>
+          </a:bodyPr>
+          <a:lstStyle/>
+          <a:p>
+            <a:pPr marL="342900" indent="-342900">
+              <a:buAutoNum type="arabicPeriod"/>
+            </a:pPr>
+            <a:r>
+              <a:rPr lang="ko-KR" altLang="en-US" dirty="0"/>
+              <a:t>개인 정보 처리</a:t>
+            </a:r>
+            <a:endParaRPr lang="en-US" altLang="ko-KR" dirty="0"/>
+          </a:p>
+          <a:p>
+            <a:r>
+              <a:rPr lang="en-US" altLang="ko-KR" dirty="0"/>
+              <a:t>	- </a:t>
+            </a:r>
+            <a:r>
+              <a:rPr lang="ko-KR" altLang="en-US" dirty="0"/>
+              <a:t>로그인 기능</a:t>
+            </a:r>
+            <a:endParaRPr lang="en-US" altLang="ko-KR" dirty="0"/>
+          </a:p>
+          <a:p>
+            <a:r>
+              <a:rPr lang="en-US" altLang="ko-KR" dirty="0"/>
+              <a:t>	- </a:t>
+            </a:r>
+            <a:r>
+              <a:rPr lang="ko-KR" altLang="en-US" dirty="0"/>
+              <a:t>암호화 처리</a:t>
+            </a:r>
+            <a:endParaRPr lang="en-US" altLang="ko-KR" dirty="0"/>
+          </a:p>
+          <a:p>
+            <a:pPr marL="342900" indent="-342900">
+              <a:buAutoNum type="arabicPeriod" startAt="2"/>
+            </a:pPr>
+            <a:r>
+              <a:rPr lang="ko-KR" altLang="en-US" dirty="0"/>
+              <a:t>생체정보 저장 기능</a:t>
+            </a:r>
+            <a:endParaRPr lang="en-US" altLang="ko-KR" dirty="0"/>
+          </a:p>
+          <a:p>
+            <a:r>
+              <a:rPr lang="en-US" altLang="ko-KR" dirty="0"/>
+              <a:t>	- </a:t>
+            </a:r>
+            <a:r>
+              <a:rPr lang="ko-KR" altLang="en-US" dirty="0"/>
+              <a:t>혈당 수치 기록 기능</a:t>
+            </a:r>
+            <a:endParaRPr lang="en-US" altLang="ko-KR" dirty="0"/>
+          </a:p>
+          <a:p>
+            <a:r>
+              <a:rPr lang="en-US" altLang="ko-KR" dirty="0"/>
+              <a:t>	- </a:t>
+            </a:r>
+            <a:r>
+              <a:rPr lang="ko-KR" altLang="en-US" dirty="0"/>
+              <a:t>투약 관련 기록 기능</a:t>
+            </a:r>
+            <a:endParaRPr lang="en-US" altLang="ko-KR" dirty="0"/>
+          </a:p>
+          <a:p>
+            <a:r>
+              <a:rPr lang="en-US" altLang="ko-KR" dirty="0"/>
+              <a:t>	- </a:t>
+            </a:r>
+            <a:r>
+              <a:rPr lang="ko-KR" altLang="en-US" dirty="0"/>
+              <a:t>식단 기록 기능</a:t>
+            </a:r>
+            <a:endParaRPr lang="en-US" altLang="ko-KR" dirty="0"/>
+          </a:p>
+          <a:p>
+            <a:pPr marL="342900" indent="-342900">
+              <a:buAutoNum type="arabicPeriod" startAt="3"/>
+            </a:pPr>
+            <a:r>
+              <a:rPr lang="ko-KR" altLang="en-US" dirty="0"/>
+              <a:t>심리치료 기능</a:t>
+            </a:r>
+            <a:endParaRPr lang="en-US" altLang="ko-KR" dirty="0"/>
+          </a:p>
+          <a:p>
+            <a:r>
+              <a:rPr lang="en-US" altLang="ko-KR" dirty="0"/>
+              <a:t>	- </a:t>
+            </a:r>
+            <a:r>
+              <a:rPr lang="ko-KR" altLang="en-US" dirty="0"/>
+              <a:t>텍스트 기반 심리상태 기록 및 저장 기능</a:t>
+            </a:r>
+            <a:endParaRPr lang="en-US" altLang="ko-KR" dirty="0"/>
+          </a:p>
+          <a:p>
+            <a:r>
+              <a:rPr lang="en-US" altLang="ko-KR" dirty="0"/>
+              <a:t>	- </a:t>
+            </a:r>
+            <a:r>
+              <a:rPr lang="ko-KR" altLang="en-US" dirty="0"/>
+              <a:t>입력된 심리상태 기본적 분석 기능</a:t>
+            </a:r>
+            <a:endParaRPr lang="en-US" altLang="ko-KR" dirty="0"/>
+          </a:p>
+        </p:txBody>
+      </p:sp>
+      <p:pic>
+        <p:nvPicPr>
+          <p:cNvPr id="5" name="그림 4">
+            <a:extLst>
+              <a:ext uri="{FF2B5EF4-FFF2-40B4-BE49-F238E27FC236}">
+                <a16:creationId xmlns:a16="http://schemas.microsoft.com/office/drawing/2014/main" id="{4934375C-3242-48E5-8DBB-A06A92B78F72}"/>
+              </a:ext>
+            </a:extLst>
+          </p:cNvPr>
+          <p:cNvPicPr>
+            <a:picLocks noChangeAspect="1"/>
+          </p:cNvPicPr>
+          <p:nvPr/>
+        </p:nvPicPr>
+        <p:blipFill>
+          <a:blip r:embed="rId2"/>
+          <a:stretch>
+            <a:fillRect/>
+          </a:stretch>
+        </p:blipFill>
+        <p:spPr>
+          <a:xfrm>
+            <a:off x="157993" y="3694113"/>
+            <a:ext cx="11859836" cy="2874880"/>
+          </a:xfrm>
+          <a:prstGeom prst="rect">
+            <a:avLst/>
+          </a:prstGeom>
+          <a:ln>
+            <a:solidFill>
+              <a:schemeClr val="accent1"/>
+            </a:solidFill>
+          </a:ln>
+        </p:spPr>
+      </p:pic>
+    </p:spTree>
+    <p:extLst>
+      <p:ext uri="{BB962C8B-B14F-4D97-AF65-F5344CB8AC3E}">
+        <p14:creationId xmlns:p14="http://schemas.microsoft.com/office/powerpoint/2010/main" val="1873579609"/>
       </p:ext>
     </p:extLst>
   </p:cSld>
@@ -5254,4 +6202,299 @@
     </a:ext>
   </a:extLst>
 </a:theme>
+</file>
+
+<file path=ppt/theme/theme2.xml><?xml version="1.0" encoding="utf-8"?>
+<a:theme xmlns:a="http://schemas.openxmlformats.org/drawingml/2006/main" name="Office 테마">
+  <a:themeElements>
+    <a:clrScheme name="Office">
+      <a:dk1>
+        <a:sysClr val="windowText" lastClr="000000"/>
+      </a:dk1>
+      <a:lt1>
+        <a:sysClr val="window" lastClr="FFFFFF"/>
+      </a:lt1>
+      <a:dk2>
+        <a:srgbClr val="44546A"/>
+      </a:dk2>
+      <a:lt2>
+        <a:srgbClr val="E7E6E6"/>
+      </a:lt2>
+      <a:accent1>
+        <a:srgbClr val="4472C4"/>
+      </a:accent1>
+      <a:accent2>
+        <a:srgbClr val="ED7D31"/>
+      </a:accent2>
+      <a:accent3>
+        <a:srgbClr val="A5A5A5"/>
+      </a:accent3>
+      <a:accent4>
+        <a:srgbClr val="FFC000"/>
+      </a:accent4>
+      <a:accent5>
+        <a:srgbClr val="5B9BD5"/>
+      </a:accent5>
+      <a:accent6>
+        <a:srgbClr val="70AD47"/>
+      </a:accent6>
+      <a:hlink>
+        <a:srgbClr val="0563C1"/>
+      </a:hlink>
+      <a:folHlink>
+        <a:srgbClr val="954F72"/>
+      </a:folHlink>
+    </a:clrScheme>
+    <a:fontScheme name="Office">
+      <a:majorFont>
+        <a:latin typeface="맑은 고딕" panose="020F0302020204030204"/>
+        <a:ea typeface=""/>
+        <a:cs typeface=""/>
+        <a:font script="Jpan" typeface="游ゴシック Light"/>
+        <a:font script="Hang" typeface="맑은 고딕"/>
+        <a:font script="Hans" typeface="等线 Light"/>
+        <a:font script="Hant" typeface="新細明體"/>
+        <a:font script="Arab" typeface="Times New Roman"/>
+        <a:font script="Hebr" typeface="Times New Roman"/>
+        <a:font script="Thai" typeface="Angsana New"/>
+        <a:font script="Ethi" typeface="Nyala"/>
+        <a:font script="Beng" typeface="Vrinda"/>
+        <a:font script="Gujr" typeface="Shruti"/>
+        <a:font script="Khmr" typeface="MoolBoran"/>
+        <a:font script="Knda" typeface="Tunga"/>
+        <a:font script="Guru" typeface="Raavi"/>
+        <a:font script="Cans" typeface="Euphemia"/>
+        <a:font script="Cher" typeface="Plantagenet Cherokee"/>
+        <a:font script="Yiii" typeface="Microsoft Yi Baiti"/>
+        <a:font script="Tibt" typeface="Microsoft Himalaya"/>
+        <a:font script="Thaa" typeface="MV Boli"/>
+        <a:font script="Deva" typeface="Mangal"/>
+        <a:font script="Telu" typeface="Gautami"/>
+        <a:font script="Taml" typeface="Latha"/>
+        <a:font script="Syrc" typeface="Estrangelo Edessa"/>
+        <a:font script="Orya" typeface="Kalinga"/>
+        <a:font script="Mlym" typeface="Kartika"/>
+        <a:font script="Laoo" typeface="DokChampa"/>
+        <a:font script="Sinh" typeface="Iskoola Pota"/>
+        <a:font script="Mong" typeface="Mongolian Baiti"/>
+        <a:font script="Viet" typeface="Times New Roman"/>
+        <a:font script="Uigh" typeface="Microsoft Uighur"/>
+        <a:font script="Geor" typeface="Sylfaen"/>
+        <a:font script="Armn" typeface="Arial"/>
+        <a:font script="Bugi" typeface="Leelawadee UI"/>
+        <a:font script="Bopo" typeface="Microsoft JhengHei"/>
+        <a:font script="Java" typeface="Javanese Text"/>
+        <a:font script="Lisu" typeface="Segoe UI"/>
+        <a:font script="Mymr" typeface="Myanmar Text"/>
+        <a:font script="Nkoo" typeface="Ebrima"/>
+        <a:font script="Olck" typeface="Nirmala UI"/>
+        <a:font script="Osma" typeface="Ebrima"/>
+        <a:font script="Phag" typeface="Phagspa"/>
+        <a:font script="Syrn" typeface="Estrangelo Edessa"/>
+        <a:font script="Syrj" typeface="Estrangelo Edessa"/>
+        <a:font script="Syre" typeface="Estrangelo Edessa"/>
+        <a:font script="Sora" typeface="Nirmala UI"/>
+        <a:font script="Tale" typeface="Microsoft Tai Le"/>
+        <a:font script="Talu" typeface="Microsoft New Tai Lue"/>
+        <a:font script="Tfng" typeface="Ebrima"/>
+      </a:majorFont>
+      <a:minorFont>
+        <a:latin typeface="맑은 고딕" panose="020F0502020204030204"/>
+        <a:ea typeface=""/>
+        <a:cs typeface=""/>
+        <a:font script="Jpan" typeface="游ゴシック"/>
+        <a:font script="Hang" typeface="맑은 고딕"/>
+        <a:font script="Hans" typeface="等线"/>
+        <a:font script="Hant" typeface="新細明體"/>
+        <a:font script="Arab" typeface="Arial"/>
+        <a:font script="Hebr" typeface="Arial"/>
+        <a:font script="Thai" typeface="Cordia New"/>
+        <a:font script="Ethi" typeface="Nyala"/>
+        <a:font script="Beng" typeface="Vrinda"/>
+        <a:font script="Gujr" typeface="Shruti"/>
+        <a:font script="Khmr" typeface="DaunPenh"/>
+        <a:font script="Knda" typeface="Tunga"/>
+        <a:font script="Guru" typeface="Raavi"/>
+        <a:font script="Cans" typeface="Euphemia"/>
+        <a:font script="Cher" typeface="Plantagenet Cherokee"/>
+        <a:font script="Yiii" typeface="Microsoft Yi Baiti"/>
+        <a:font script="Tibt" typeface="Microsoft Himalaya"/>
+        <a:font script="Thaa" typeface="MV Boli"/>
+        <a:font script="Deva" typeface="Mangal"/>
+        <a:font script="Telu" typeface="Gautami"/>
+        <a:font script="Taml" typeface="Latha"/>
+        <a:font script="Syrc" typeface="Estrangelo Edessa"/>
+        <a:font script="Orya" typeface="Kalinga"/>
+        <a:font script="Mlym" typeface="Kartika"/>
+        <a:font script="Laoo" typeface="DokChampa"/>
+        <a:font script="Sinh" typeface="Iskoola Pota"/>
+        <a:font script="Mong" typeface="Mongolian Baiti"/>
+        <a:font script="Viet" typeface="Arial"/>
+        <a:font script="Uigh" typeface="Microsoft Uighur"/>
+        <a:font script="Geor" typeface="Sylfaen"/>
+        <a:font script="Armn" typeface="Arial"/>
+        <a:font script="Bugi" typeface="Leelawadee UI"/>
+        <a:font script="Bopo" typeface="Microsoft JhengHei"/>
+        <a:font script="Java" typeface="Javanese Text"/>
+        <a:font script="Lisu" typeface="Segoe UI"/>
+        <a:font script="Mymr" typeface="Myanmar Text"/>
+        <a:font script="Nkoo" typeface="Ebrima"/>
+        <a:font script="Olck" typeface="Nirmala UI"/>
+        <a:font script="Osma" typeface="Ebrima"/>
+        <a:font script="Phag" typeface="Phagspa"/>
+        <a:font script="Syrn" typeface="Estrangelo Edessa"/>
+        <a:font script="Syrj" typeface="Estrangelo Edessa"/>
+        <a:font script="Syre" typeface="Estrangelo Edessa"/>
+        <a:font script="Sora" typeface="Nirmala UI"/>
+        <a:font script="Tale" typeface="Microsoft Tai Le"/>
+        <a:font script="Talu" typeface="Microsoft New Tai Lue"/>
+        <a:font script="Tfng" typeface="Ebrima"/>
+      </a:minorFont>
+    </a:fontScheme>
+    <a:fmtScheme name="Office">
+      <a:fillStyleLst>
+        <a:solidFill>
+          <a:schemeClr val="phClr"/>
+        </a:solidFill>
+        <a:gradFill rotWithShape="1">
+          <a:gsLst>
+            <a:gs pos="0">
+              <a:schemeClr val="phClr">
+                <a:lumMod val="110000"/>
+                <a:satMod val="105000"/>
+                <a:tint val="67000"/>
+              </a:schemeClr>
+            </a:gs>
+            <a:gs pos="50000">
+              <a:schemeClr val="phClr">
+                <a:lumMod val="105000"/>
+                <a:satMod val="103000"/>
+                <a:tint val="73000"/>
+              </a:schemeClr>
+            </a:gs>
+            <a:gs pos="100000">
+              <a:schemeClr val="phClr">
+                <a:lumMod val="105000"/>
+                <a:satMod val="109000"/>
+                <a:tint val="81000"/>
+              </a:schemeClr>
+            </a:gs>
+          </a:gsLst>
+          <a:lin ang="5400000" scaled="0"/>
+        </a:gradFill>
+        <a:gradFill rotWithShape="1">
+          <a:gsLst>
+            <a:gs pos="0">
+              <a:schemeClr val="phClr">
+                <a:satMod val="103000"/>
+                <a:lumMod val="102000"/>
+                <a:tint val="94000"/>
+              </a:schemeClr>
+            </a:gs>
+            <a:gs pos="50000">
+              <a:schemeClr val="phClr">
+                <a:satMod val="110000"/>
+                <a:lumMod val="100000"/>
+                <a:shade val="100000"/>
+              </a:schemeClr>
+            </a:gs>
+            <a:gs pos="100000">
+              <a:schemeClr val="phClr">
+                <a:lumMod val="99000"/>
+                <a:satMod val="120000"/>
+                <a:shade val="78000"/>
+              </a:schemeClr>
+            </a:gs>
+          </a:gsLst>
+          <a:lin ang="5400000" scaled="0"/>
+        </a:gradFill>
+      </a:fillStyleLst>
+      <a:lnStyleLst>
+        <a:ln w="6350" cap="flat" cmpd="sng" algn="ctr">
+          <a:solidFill>
+            <a:schemeClr val="phClr"/>
+          </a:solidFill>
+          <a:prstDash val="solid"/>
+          <a:miter lim="800000"/>
+        </a:ln>
+        <a:ln w="12700" cap="flat" cmpd="sng" algn="ctr">
+          <a:solidFill>
+            <a:schemeClr val="phClr"/>
+          </a:solidFill>
+          <a:prstDash val="solid"/>
+          <a:miter lim="800000"/>
+        </a:ln>
+        <a:ln w="19050" cap="flat" cmpd="sng" algn="ctr">
+          <a:solidFill>
+            <a:schemeClr val="phClr"/>
+          </a:solidFill>
+          <a:prstDash val="solid"/>
+          <a:miter lim="800000"/>
+        </a:ln>
+      </a:lnStyleLst>
+      <a:effectStyleLst>
+        <a:effectStyle>
+          <a:effectLst/>
+        </a:effectStyle>
+        <a:effectStyle>
+          <a:effectLst/>
+        </a:effectStyle>
+        <a:effectStyle>
+          <a:effectLst>
+            <a:outerShdw blurRad="57150" dist="19050" dir="5400000" algn="ctr" rotWithShape="0">
+              <a:srgbClr val="000000">
+                <a:alpha val="63000"/>
+              </a:srgbClr>
+            </a:outerShdw>
+          </a:effectLst>
+        </a:effectStyle>
+      </a:effectStyleLst>
+      <a:bgFillStyleLst>
+        <a:solidFill>
+          <a:schemeClr val="phClr"/>
+        </a:solidFill>
+        <a:solidFill>
+          <a:schemeClr val="phClr">
+            <a:tint val="95000"/>
+            <a:satMod val="170000"/>
+          </a:schemeClr>
+        </a:solidFill>
+        <a:gradFill rotWithShape="1">
+          <a:gsLst>
+            <a:gs pos="0">
+              <a:schemeClr val="phClr">
+                <a:tint val="93000"/>
+                <a:satMod val="150000"/>
+                <a:shade val="98000"/>
+                <a:lumMod val="102000"/>
+              </a:schemeClr>
+            </a:gs>
+            <a:gs pos="50000">
+              <a:schemeClr val="phClr">
+                <a:tint val="98000"/>
+                <a:satMod val="130000"/>
+                <a:shade val="90000"/>
+                <a:lumMod val="103000"/>
+              </a:schemeClr>
+            </a:gs>
+            <a:gs pos="100000">
+              <a:schemeClr val="phClr">
+                <a:shade val="63000"/>
+                <a:satMod val="120000"/>
+              </a:schemeClr>
+            </a:gs>
+          </a:gsLst>
+          <a:lin ang="5400000" scaled="0"/>
+        </a:gradFill>
+      </a:bgFillStyleLst>
+    </a:fmtScheme>
+  </a:themeElements>
+  <a:objectDefaults/>
+  <a:extraClrSchemeLst/>
+  <a:extLst>
+    <a:ext uri="{05A4C25C-085E-4340-85A3-A5531E510DB2}">
+      <thm15:themeFamily xmlns:thm15="http://schemas.microsoft.com/office/thememl/2012/main" name="Office Theme" id="{62F939B6-93AF-4DB8-9C6B-D6C7DFDC589F}" vid="{4A3C46E8-61CC-4603-A589-7422A47A8E4A}"/>
+    </a:ext>
+  </a:extLst>
+</a:theme>
 </file>
</xml_diff>

<commit_message>
translated the presentation file to English
additional need for changing diagram
</commit_message>
<xml_diff>
--- a/Documents/캡스톤_6조_1주차.pptx
+++ b/Documents/캡스톤_6조_1주차.pptx
@@ -120,6 +120,9 @@
     <p:ext uri="{EFAFB233-063F-42B5-8137-9DF3F51BA10A}">
       <p15:sldGuideLst xmlns:p15="http://schemas.microsoft.com/office/powerpoint/2012/main"/>
     </p:ext>
+    <p:ext uri="{2D200454-40CA-4A62-9FC3-DE9A4176ACB9}">
+      <p15:notesGuideLst xmlns:p15="http://schemas.microsoft.com/office/powerpoint/2012/main"/>
+    </p:ext>
   </p:extLst>
 </p:presentation>
 </file>
@@ -206,7 +209,7 @@
           <a:p>
             <a:fld id="{8C6E51E7-5436-425B-B251-3FA1F61854D1}" type="datetimeFigureOut">
               <a:rPr lang="ko-KR" altLang="en-US" smtClean="0"/>
-              <a:t>2019-03-08</a:t>
+              <a:t>2019-03-10</a:t>
             </a:fld>
             <a:endParaRPr lang="ko-KR" altLang="en-US"/>
           </a:p>
@@ -985,7 +988,7 @@
           <a:p>
             <a:fld id="{8FFD4D7F-A2C0-416B-ABCD-722CD65DF1B3}" type="datetimeFigureOut">
               <a:rPr lang="ko-KR" altLang="en-US" smtClean="0"/>
-              <a:t>2019-03-08</a:t>
+              <a:t>2019-03-10</a:t>
             </a:fld>
             <a:endParaRPr lang="ko-KR" altLang="en-US"/>
           </a:p>
@@ -1183,7 +1186,7 @@
           <a:p>
             <a:fld id="{8FFD4D7F-A2C0-416B-ABCD-722CD65DF1B3}" type="datetimeFigureOut">
               <a:rPr lang="ko-KR" altLang="en-US" smtClean="0"/>
-              <a:t>2019-03-08</a:t>
+              <a:t>2019-03-10</a:t>
             </a:fld>
             <a:endParaRPr lang="ko-KR" altLang="en-US"/>
           </a:p>
@@ -1391,7 +1394,7 @@
           <a:p>
             <a:fld id="{8FFD4D7F-A2C0-416B-ABCD-722CD65DF1B3}" type="datetimeFigureOut">
               <a:rPr lang="ko-KR" altLang="en-US" smtClean="0"/>
-              <a:t>2019-03-08</a:t>
+              <a:t>2019-03-10</a:t>
             </a:fld>
             <a:endParaRPr lang="ko-KR" altLang="en-US"/>
           </a:p>
@@ -1589,7 +1592,7 @@
           <a:p>
             <a:fld id="{8FFD4D7F-A2C0-416B-ABCD-722CD65DF1B3}" type="datetimeFigureOut">
               <a:rPr lang="ko-KR" altLang="en-US" smtClean="0"/>
-              <a:t>2019-03-08</a:t>
+              <a:t>2019-03-10</a:t>
             </a:fld>
             <a:endParaRPr lang="ko-KR" altLang="en-US"/>
           </a:p>
@@ -1864,7 +1867,7 @@
           <a:p>
             <a:fld id="{8FFD4D7F-A2C0-416B-ABCD-722CD65DF1B3}" type="datetimeFigureOut">
               <a:rPr lang="ko-KR" altLang="en-US" smtClean="0"/>
-              <a:t>2019-03-08</a:t>
+              <a:t>2019-03-10</a:t>
             </a:fld>
             <a:endParaRPr lang="ko-KR" altLang="en-US"/>
           </a:p>
@@ -2129,7 +2132,7 @@
           <a:p>
             <a:fld id="{8FFD4D7F-A2C0-416B-ABCD-722CD65DF1B3}" type="datetimeFigureOut">
               <a:rPr lang="ko-KR" altLang="en-US" smtClean="0"/>
-              <a:t>2019-03-08</a:t>
+              <a:t>2019-03-10</a:t>
             </a:fld>
             <a:endParaRPr lang="ko-KR" altLang="en-US"/>
           </a:p>
@@ -2541,7 +2544,7 @@
           <a:p>
             <a:fld id="{8FFD4D7F-A2C0-416B-ABCD-722CD65DF1B3}" type="datetimeFigureOut">
               <a:rPr lang="ko-KR" altLang="en-US" smtClean="0"/>
-              <a:t>2019-03-08</a:t>
+              <a:t>2019-03-10</a:t>
             </a:fld>
             <a:endParaRPr lang="ko-KR" altLang="en-US"/>
           </a:p>
@@ -2682,7 +2685,7 @@
           <a:p>
             <a:fld id="{8FFD4D7F-A2C0-416B-ABCD-722CD65DF1B3}" type="datetimeFigureOut">
               <a:rPr lang="ko-KR" altLang="en-US" smtClean="0"/>
-              <a:t>2019-03-08</a:t>
+              <a:t>2019-03-10</a:t>
             </a:fld>
             <a:endParaRPr lang="ko-KR" altLang="en-US"/>
           </a:p>
@@ -2795,7 +2798,7 @@
           <a:p>
             <a:fld id="{8FFD4D7F-A2C0-416B-ABCD-722CD65DF1B3}" type="datetimeFigureOut">
               <a:rPr lang="ko-KR" altLang="en-US" smtClean="0"/>
-              <a:t>2019-03-08</a:t>
+              <a:t>2019-03-10</a:t>
             </a:fld>
             <a:endParaRPr lang="ko-KR" altLang="en-US"/>
           </a:p>
@@ -3106,7 +3109,7 @@
           <a:p>
             <a:fld id="{8FFD4D7F-A2C0-416B-ABCD-722CD65DF1B3}" type="datetimeFigureOut">
               <a:rPr lang="ko-KR" altLang="en-US" smtClean="0"/>
-              <a:t>2019-03-08</a:t>
+              <a:t>2019-03-10</a:t>
             </a:fld>
             <a:endParaRPr lang="ko-KR" altLang="en-US"/>
           </a:p>
@@ -3394,7 +3397,7 @@
           <a:p>
             <a:fld id="{8FFD4D7F-A2C0-416B-ABCD-722CD65DF1B3}" type="datetimeFigureOut">
               <a:rPr lang="ko-KR" altLang="en-US" smtClean="0"/>
-              <a:t>2019-03-08</a:t>
+              <a:t>2019-03-10</a:t>
             </a:fld>
             <a:endParaRPr lang="ko-KR" altLang="en-US"/>
           </a:p>
@@ -3635,7 +3638,7 @@
           <a:p>
             <a:fld id="{8FFD4D7F-A2C0-416B-ABCD-722CD65DF1B3}" type="datetimeFigureOut">
               <a:rPr lang="ko-KR" altLang="en-US" smtClean="0"/>
-              <a:t>2019-03-08</a:t>
+              <a:t>2019-03-10</a:t>
             </a:fld>
             <a:endParaRPr lang="ko-KR" altLang="en-US"/>
           </a:p>
@@ -4083,13 +4086,8 @@
             <a:pPr algn="ctr"/>
             <a:r>
               <a:rPr lang="en-US" altLang="ko-KR" sz="2800" dirty="0"/>
-              <a:t>6</a:t>
-            </a:r>
-            <a:r>
-              <a:rPr lang="ko-KR" altLang="en-US" sz="2800" dirty="0"/>
-              <a:t>조</a:t>
-            </a:r>
-            <a:endParaRPr lang="en-US" altLang="ko-KR" sz="2800" dirty="0"/>
+              <a:t>Group 6</a:t>
+            </a:r>
           </a:p>
           <a:p>
             <a:pPr algn="ctr"/>
@@ -4135,8 +4133,8 @@
         </p:nvSpPr>
         <p:spPr>
           <a:xfrm>
-            <a:off x="174171" y="679905"/>
-            <a:ext cx="11773756" cy="1323439"/>
+            <a:off x="209122" y="407872"/>
+            <a:ext cx="11773756" cy="2123658"/>
           </a:xfrm>
           <a:prstGeom prst="rect">
             <a:avLst/>
@@ -4151,15 +4149,8 @@
           <a:p>
             <a:pPr algn="ctr"/>
             <a:r>
-              <a:rPr lang="ko-KR" altLang="en-US" sz="4000" dirty="0"/>
-              <a:t>인지행동치료 기법을 적용한</a:t>
-            </a:r>
-            <a:br>
-              <a:rPr lang="en-US" altLang="ko-KR" sz="4000" dirty="0"/>
-            </a:br>
-            <a:r>
-              <a:rPr lang="ko-KR" altLang="en-US" sz="4000" dirty="0"/>
-              <a:t> 당뇨병 관리 모바일 어플리케이션</a:t>
+              <a:rPr lang="en-US" altLang="ko-KR" sz="4400" dirty="0"/>
+              <a:t>An Mobile Application for Diabetes Self-Management with Self-guided Cognitive-Behavioral Therapy(CBT)</a:t>
             </a:r>
           </a:p>
         </p:txBody>
@@ -4180,7 +4171,7 @@
         </p:nvCxnSpPr>
         <p:spPr>
           <a:xfrm>
-            <a:off x="853440" y="1994263"/>
+            <a:off x="853440" y="2531530"/>
             <a:ext cx="10496870" cy="35393"/>
           </a:xfrm>
           <a:prstGeom prst="line">
@@ -4359,8 +4350,8 @@
         </p:nvSpPr>
         <p:spPr>
           <a:xfrm>
-            <a:off x="5222132" y="1277149"/>
-            <a:ext cx="1747736" cy="1015663"/>
+            <a:off x="2194560" y="1059434"/>
+            <a:ext cx="7802880" cy="1015663"/>
           </a:xfrm>
           <a:prstGeom prst="rect">
             <a:avLst/>
@@ -4373,10 +4364,12 @@
           </a:bodyPr>
           <a:lstStyle/>
           <a:p>
-            <a:r>
-              <a:rPr lang="ko-KR" altLang="en-US" sz="6000" dirty="0"/>
-              <a:t>목차</a:t>
-            </a:r>
+            <a:pPr algn="ctr"/>
+            <a:r>
+              <a:rPr lang="en-US" altLang="ko-KR" sz="6000" dirty="0"/>
+              <a:t>Table of Contents</a:t>
+            </a:r>
+            <a:endParaRPr lang="ko-KR" altLang="en-US" sz="6000" dirty="0"/>
           </a:p>
         </p:txBody>
       </p:sp>
@@ -4394,8 +4387,8 @@
         </p:nvSpPr>
         <p:spPr>
           <a:xfrm>
-            <a:off x="1378511" y="4043493"/>
-            <a:ext cx="1817696" cy="1384995"/>
+            <a:off x="433073" y="4052201"/>
+            <a:ext cx="2856573" cy="523220"/>
           </a:xfrm>
           <a:prstGeom prst="rect">
             <a:avLst/>
@@ -4410,24 +4403,10 @@
           <a:p>
             <a:pPr algn="ctr"/>
             <a:r>
-              <a:rPr lang="ko-KR" altLang="en-US" sz="2800" dirty="0"/>
-              <a:t>개발 배경</a:t>
-            </a:r>
-            <a:br>
               <a:rPr lang="en-US" altLang="ko-KR" sz="2800" dirty="0"/>
-            </a:br>
-            <a:r>
-              <a:rPr lang="ko-KR" altLang="en-US" sz="2800" dirty="0"/>
-              <a:t>및</a:t>
-            </a:r>
-            <a:endParaRPr lang="en-US" altLang="ko-KR" sz="2800" dirty="0"/>
-          </a:p>
-          <a:p>
-            <a:pPr algn="ctr"/>
-            <a:r>
-              <a:rPr lang="ko-KR" altLang="en-US" sz="2800" dirty="0"/>
-              <a:t>소개 </a:t>
-            </a:r>
+              <a:t>Background</a:t>
+            </a:r>
+            <a:endParaRPr lang="ko-KR" altLang="en-US" sz="2800" dirty="0"/>
           </a:p>
         </p:txBody>
       </p:sp>
@@ -4445,8 +4424,8 @@
         </p:nvSpPr>
         <p:spPr>
           <a:xfrm>
-            <a:off x="3929824" y="4043493"/>
-            <a:ext cx="1912437" cy="523220"/>
+            <a:off x="3242581" y="4052201"/>
+            <a:ext cx="3005462" cy="523220"/>
           </a:xfrm>
           <a:prstGeom prst="rect">
             <a:avLst/>
@@ -4461,9 +4440,10 @@
           <a:p>
             <a:pPr algn="ctr"/>
             <a:r>
-              <a:rPr lang="ko-KR" altLang="en-US" sz="2800" dirty="0"/>
-              <a:t>구현 내용</a:t>
-            </a:r>
+              <a:rPr lang="en-US" altLang="ko-KR" sz="2800" dirty="0"/>
+              <a:t>Implementation</a:t>
+            </a:r>
+            <a:endParaRPr lang="ko-KR" altLang="en-US" sz="2800" dirty="0"/>
           </a:p>
         </p:txBody>
       </p:sp>
@@ -4481,8 +4461,8 @@
         </p:nvSpPr>
         <p:spPr>
           <a:xfrm>
-            <a:off x="6575878" y="4043493"/>
-            <a:ext cx="2002283" cy="523220"/>
+            <a:off x="6200978" y="4052201"/>
+            <a:ext cx="3146658" cy="523220"/>
           </a:xfrm>
           <a:prstGeom prst="rect">
             <a:avLst/>
@@ -4497,9 +4477,10 @@
           <a:p>
             <a:pPr algn="ctr"/>
             <a:r>
-              <a:rPr lang="ko-KR" altLang="en-US" sz="2800"/>
-              <a:t>개발 일정</a:t>
-            </a:r>
+              <a:rPr lang="en-US" altLang="ko-KR" sz="2800" dirty="0"/>
+              <a:t>Schedule</a:t>
+            </a:r>
+            <a:endParaRPr lang="ko-KR" altLang="en-US" sz="2800" dirty="0"/>
           </a:p>
         </p:txBody>
       </p:sp>
@@ -4517,8 +4498,8 @@
         </p:nvSpPr>
         <p:spPr>
           <a:xfrm>
-            <a:off x="9311777" y="4043493"/>
-            <a:ext cx="1501713" cy="523220"/>
+            <a:off x="9300570" y="4052201"/>
+            <a:ext cx="2359995" cy="523220"/>
           </a:xfrm>
           <a:prstGeom prst="rect">
             <a:avLst/>
@@ -4616,8 +4597,8 @@
           <a:p>
             <a:pPr algn="ctr"/>
             <a:r>
-              <a:rPr lang="ko-KR" altLang="en-US" sz="4000"/>
-              <a:t>개발 배경 및 소개</a:t>
+              <a:rPr lang="en-US" altLang="ko-KR" sz="4000" dirty="0"/>
+              <a:t>Background</a:t>
             </a:r>
             <a:endParaRPr lang="ko-KR" altLang="en-US" sz="4000" dirty="0"/>
           </a:p>
@@ -4751,9 +4732,10 @@
           <a:p>
             <a:pPr algn="ctr"/>
             <a:r>
-              <a:rPr lang="ko-KR" altLang="en-US" dirty="0"/>
-              <a:t>신체와 정신 건강의 통합적 관리 체계 필요</a:t>
-            </a:r>
+              <a:rPr lang="en-US" altLang="ko-KR" dirty="0"/>
+              <a:t>A need for managing both physiological and psychological aspects</a:t>
+            </a:r>
+            <a:endParaRPr lang="ko-KR" altLang="en-US" dirty="0"/>
           </a:p>
         </p:txBody>
       </p:sp>
@@ -4817,16 +4799,10 @@
           <a:p>
             <a:pPr algn="ctr"/>
             <a:r>
-              <a:rPr lang="ko-KR" altLang="en-US" sz="1500" dirty="0"/>
-              <a:t>당뇨병 유병률</a:t>
-            </a:r>
-            <a:br>
               <a:rPr lang="en-US" altLang="ko-KR" sz="1500" dirty="0"/>
-            </a:br>
-            <a:r>
-              <a:rPr lang="ko-KR" altLang="en-US" sz="1500" dirty="0"/>
-              <a:t> 증가</a:t>
-            </a:r>
+              <a:t>Increasing prevalence rate of diabetes</a:t>
+            </a:r>
+            <a:endParaRPr lang="ko-KR" altLang="en-US" sz="1500" dirty="0"/>
           </a:p>
         </p:txBody>
       </p:sp>
@@ -4890,9 +4866,10 @@
           <a:p>
             <a:pPr algn="ctr"/>
             <a:r>
-              <a:rPr lang="ko-KR" altLang="en-US" sz="1500" dirty="0"/>
-              <a:t>지속적 라이프스타일 관리의 필요성</a:t>
-            </a:r>
+              <a:rPr lang="en-US" altLang="ko-KR" sz="1500" dirty="0"/>
+              <a:t>A need for continuous management of lifestyle</a:t>
+            </a:r>
+            <a:endParaRPr lang="ko-KR" altLang="en-US" sz="1500" dirty="0"/>
           </a:p>
         </p:txBody>
       </p:sp>
@@ -4956,8 +4933,8 @@
           <a:p>
             <a:pPr algn="ctr"/>
             <a:r>
-              <a:rPr lang="ko-KR" altLang="en-US" sz="1500"/>
-              <a:t>당뇨병과 우울증 간 인과 관계</a:t>
+              <a:rPr lang="en-US" altLang="ko-KR" sz="1500" dirty="0"/>
+              <a:t>Correlation between depression and diabetes</a:t>
             </a:r>
             <a:endParaRPr lang="ko-KR" altLang="en-US" sz="1500" dirty="0"/>
           </a:p>
@@ -5023,9 +5000,10 @@
           <a:p>
             <a:pPr algn="ctr"/>
             <a:r>
-              <a:rPr lang="ko-KR" altLang="en-US" sz="1500" dirty="0"/>
-              <a:t>기존 어플리케이션의 한계</a:t>
-            </a:r>
+              <a:rPr lang="en-US" altLang="ko-KR" sz="1500" dirty="0"/>
+              <a:t>A limitation of prior applications</a:t>
+            </a:r>
+            <a:endParaRPr lang="ko-KR" altLang="en-US" sz="1500" dirty="0"/>
           </a:p>
         </p:txBody>
       </p:sp>
@@ -5109,53 +5087,6 @@
           </a:p>
         </p:txBody>
       </p:sp>
-      <p:pic>
-        <p:nvPicPr>
-          <p:cNvPr id="1026" name="Picture 2" descr="ê°ë° ë°°ê²½ì ëí ì´ë¯¸ì§ ê²ìê²°ê³¼">
-            <a:extLst>
-              <a:ext uri="{FF2B5EF4-FFF2-40B4-BE49-F238E27FC236}">
-                <a16:creationId xmlns:a16="http://schemas.microsoft.com/office/drawing/2014/main" id="{D6630E3D-E204-441D-9B76-386A1B94CAA8}"/>
-              </a:ext>
-            </a:extLst>
-          </p:cNvPr>
-          <p:cNvPicPr>
-            <a:picLocks noChangeAspect="1" noChangeArrowheads="1"/>
-          </p:cNvPicPr>
-          <p:nvPr/>
-        </p:nvPicPr>
-        <p:blipFill>
-          <a:blip r:embed="rId3">
-            <a:extLst>
-              <a:ext uri="{28A0092B-C50C-407E-A947-70E740481C1C}">
-                <a14:useLocalDpi xmlns:a14="http://schemas.microsoft.com/office/drawing/2010/main" val="0"/>
-              </a:ext>
-            </a:extLst>
-          </a:blip>
-          <a:srcRect/>
-          <a:stretch>
-            <a:fillRect/>
-          </a:stretch>
-        </p:blipFill>
-        <p:spPr bwMode="auto">
-          <a:xfrm>
-            <a:off x="177460" y="2078627"/>
-            <a:ext cx="5442729" cy="1977525"/>
-          </a:xfrm>
-          <a:prstGeom prst="rect">
-            <a:avLst/>
-          </a:prstGeom>
-          <a:noFill/>
-          <a:extLst>
-            <a:ext uri="{909E8E84-426E-40DD-AFC4-6F175D3DCCD1}">
-              <a14:hiddenFill xmlns:a14="http://schemas.microsoft.com/office/drawing/2010/main">
-                <a:solidFill>
-                  <a:srgbClr val="FFFFFF"/>
-                </a:solidFill>
-              </a14:hiddenFill>
-            </a:ext>
-          </a:extLst>
-        </p:spPr>
-      </p:pic>
       <p:sp>
         <p:nvSpPr>
           <p:cNvPr id="11" name="TextBox 10">
@@ -5186,16 +5117,6 @@
           <a:p>
             <a:pPr algn="ctr"/>
             <a:r>
-              <a:rPr lang="ko-KR" altLang="en-US" dirty="0">
-                <a:solidFill>
-                  <a:schemeClr val="bg1">
-                    <a:lumMod val="95000"/>
-                  </a:schemeClr>
-                </a:solidFill>
-              </a:rPr>
-              <a:t>당뇨병과 동반되는 우울증을 관리할 수 있는 도구의</a:t>
-            </a:r>
-            <a:br>
               <a:rPr lang="en-US" altLang="ko-KR" dirty="0">
                 <a:solidFill>
                   <a:schemeClr val="bg1">
@@ -5203,17 +5124,15 @@
                   </a:schemeClr>
                 </a:solidFill>
               </a:rPr>
-            </a:br>
-            <a:r>
-              <a:rPr lang="ko-KR" altLang="en-US" dirty="0">
-                <a:solidFill>
-                  <a:schemeClr val="bg1">
-                    <a:lumMod val="95000"/>
-                  </a:schemeClr>
-                </a:solidFill>
-              </a:rPr>
-              <a:t> 필요성 대두</a:t>
-            </a:r>
+              <a:t>A need for managing depression comorbid with diabetes</a:t>
+            </a:r>
+            <a:endParaRPr lang="ko-KR" altLang="en-US" dirty="0">
+              <a:solidFill>
+                <a:schemeClr val="bg1">
+                  <a:lumMod val="95000"/>
+                </a:schemeClr>
+              </a:solidFill>
+            </a:endParaRPr>
           </a:p>
         </p:txBody>
       </p:sp>
@@ -5276,9 +5195,10 @@
           <a:lstStyle/>
           <a:p>
             <a:r>
-              <a:rPr lang="ko-KR" altLang="en-US" sz="2800" dirty="0"/>
-              <a:t>인지행동치료</a:t>
-            </a:r>
+              <a:rPr lang="en-US" altLang="ko-KR" sz="2800" dirty="0"/>
+              <a:t>Cognitive-Behavioral Therapy(CBT)</a:t>
+            </a:r>
+            <a:endParaRPr lang="ko-KR" altLang="en-US" sz="2800" dirty="0"/>
           </a:p>
         </p:txBody>
       </p:sp>
@@ -5311,7 +5231,7 @@
         </p:blipFill>
         <p:spPr bwMode="auto">
           <a:xfrm>
-            <a:off x="359740" y="2179924"/>
+            <a:off x="359740" y="2371516"/>
             <a:ext cx="5517185" cy="2936392"/>
           </a:xfrm>
           <a:prstGeom prst="rect">
@@ -5358,7 +5278,7 @@
         </p:blipFill>
         <p:spPr bwMode="auto">
           <a:xfrm>
-            <a:off x="6549887" y="1638345"/>
+            <a:off x="6549887" y="1829937"/>
             <a:ext cx="5120448" cy="4019551"/>
           </a:xfrm>
           <a:prstGeom prst="rect">
@@ -5390,8 +5310,8 @@
         </p:nvSpPr>
         <p:spPr>
           <a:xfrm>
-            <a:off x="6549887" y="5745917"/>
-            <a:ext cx="4619625" cy="400110"/>
+            <a:off x="6549887" y="5937509"/>
+            <a:ext cx="5120448" cy="707886"/>
           </a:xfrm>
           <a:prstGeom prst="rect">
             <a:avLst/>
@@ -5405,8 +5325,50 @@
           <a:lstStyle/>
           <a:p>
             <a:r>
-              <a:rPr lang="ko-KR" altLang="en-US" sz="2000" dirty="0"/>
-              <a:t>우울증 환자의 대표적인 인지 왜곡</a:t>
+              <a:rPr lang="en-US" altLang="ko-KR" sz="2000" dirty="0"/>
+              <a:t>Common cognitive distortion of people with depression</a:t>
+            </a:r>
+            <a:endParaRPr lang="ko-KR" altLang="en-US" sz="2000" dirty="0"/>
+          </a:p>
+        </p:txBody>
+      </p:sp>
+      <p:sp>
+        <p:nvSpPr>
+          <p:cNvPr id="8" name="TextBox 7">
+            <a:extLst>
+              <a:ext uri="{FF2B5EF4-FFF2-40B4-BE49-F238E27FC236}">
+                <a16:creationId xmlns:a16="http://schemas.microsoft.com/office/drawing/2014/main" id="{30E00262-28AE-4D15-B2E4-07E70A0CA7A2}"/>
+              </a:ext>
+            </a:extLst>
+          </p:cNvPr>
+          <p:cNvSpPr txBox="1"/>
+          <p:nvPr/>
+        </p:nvSpPr>
+        <p:spPr>
+          <a:xfrm>
+            <a:off x="662892" y="786052"/>
+            <a:ext cx="11102387" cy="707886"/>
+          </a:xfrm>
+          <a:prstGeom prst="rect">
+            <a:avLst/>
+          </a:prstGeom>
+          <a:noFill/>
+        </p:spPr>
+        <p:txBody>
+          <a:bodyPr wrap="square" rtlCol="0">
+            <a:spAutoFit/>
+          </a:bodyPr>
+          <a:lstStyle/>
+          <a:p>
+            <a:r>
+              <a:rPr lang="en-US" altLang="ko-KR" sz="2000" dirty="0"/>
+              <a:t>Developed by A. T. Beck, an psychotherapist</a:t>
+            </a:r>
+          </a:p>
+          <a:p>
+            <a:r>
+              <a:rPr lang="en-US" altLang="ko-KR" sz="2000" dirty="0"/>
+              <a:t>Most commonly used psychotherapeutic approach</a:t>
             </a:r>
           </a:p>
         </p:txBody>
@@ -5455,8 +5417,8 @@
         </p:nvSpPr>
         <p:spPr>
           <a:xfrm>
-            <a:off x="4202884" y="3075057"/>
-            <a:ext cx="3775046" cy="707886"/>
+            <a:off x="4014132" y="3075057"/>
+            <a:ext cx="4152551" cy="707886"/>
           </a:xfrm>
           <a:prstGeom prst="rect">
             <a:avLst/>
@@ -5471,9 +5433,10 @@
           <a:p>
             <a:pPr algn="ctr"/>
             <a:r>
-              <a:rPr lang="ko-KR" altLang="en-US" sz="4000" dirty="0"/>
-              <a:t>구현 내용</a:t>
-            </a:r>
+              <a:rPr lang="en-US" altLang="ko-KR" sz="4000" dirty="0"/>
+              <a:t>Implementation</a:t>
+            </a:r>
+            <a:endParaRPr lang="ko-KR" altLang="en-US" sz="4000" dirty="0"/>
           </a:p>
         </p:txBody>
       </p:sp>
@@ -5646,9 +5609,10 @@
           <a:p>
             <a:pPr algn="ctr"/>
             <a:r>
-              <a:rPr lang="ko-KR" altLang="en-US" sz="4000" dirty="0"/>
-              <a:t>개발 일정</a:t>
-            </a:r>
+              <a:rPr lang="en-US" altLang="ko-KR" sz="4000" dirty="0"/>
+              <a:t>Schedule</a:t>
+            </a:r>
+            <a:endParaRPr lang="ko-KR" altLang="en-US" sz="4000" dirty="0"/>
           </a:p>
         </p:txBody>
       </p:sp>
@@ -5757,105 +5721,72 @@
               <a:buAutoNum type="arabicPeriod"/>
             </a:pPr>
             <a:r>
-              <a:rPr lang="ko-KR" altLang="en-US" dirty="0"/>
-              <a:t>개인 정보 처리</a:t>
-            </a:r>
-            <a:endParaRPr lang="en-US" altLang="ko-KR" dirty="0"/>
-          </a:p>
-          <a:p>
-            <a:r>
               <a:rPr lang="en-US" altLang="ko-KR" dirty="0"/>
-              <a:t>	- </a:t>
-            </a:r>
-            <a:r>
-              <a:rPr lang="ko-KR" altLang="en-US" dirty="0"/>
-              <a:t>로그인 기능</a:t>
-            </a:r>
-            <a:endParaRPr lang="en-US" altLang="ko-KR" dirty="0"/>
+              <a:t>Processing personal information</a:t>
+            </a:r>
           </a:p>
           <a:p>
             <a:r>
               <a:rPr lang="en-US" altLang="ko-KR" dirty="0"/>
-              <a:t>	- </a:t>
-            </a:r>
-            <a:r>
-              <a:rPr lang="ko-KR" altLang="en-US" dirty="0"/>
-              <a:t>암호화 처리</a:t>
-            </a:r>
-            <a:endParaRPr lang="en-US" altLang="ko-KR" dirty="0"/>
+              <a:t>	- Login function</a:t>
+            </a:r>
+          </a:p>
+          <a:p>
+            <a:r>
+              <a:rPr lang="en-US" altLang="ko-KR" dirty="0"/>
+              <a:t>	- Encryption</a:t>
+            </a:r>
           </a:p>
           <a:p>
             <a:pPr marL="342900" indent="-342900">
               <a:buAutoNum type="arabicPeriod" startAt="2"/>
             </a:pPr>
             <a:r>
-              <a:rPr lang="ko-KR" altLang="en-US" dirty="0"/>
-              <a:t>생체정보 저장 기능</a:t>
-            </a:r>
-            <a:endParaRPr lang="en-US" altLang="ko-KR" dirty="0"/>
-          </a:p>
-          <a:p>
-            <a:r>
               <a:rPr lang="en-US" altLang="ko-KR" dirty="0"/>
-              <a:t>	- </a:t>
-            </a:r>
-            <a:r>
-              <a:rPr lang="ko-KR" altLang="en-US" dirty="0"/>
-              <a:t>혈당 수치 기록 기능</a:t>
-            </a:r>
-            <a:endParaRPr lang="en-US" altLang="ko-KR" dirty="0"/>
+              <a:t>Storing Physiological information</a:t>
+            </a:r>
           </a:p>
           <a:p>
             <a:r>
               <a:rPr lang="en-US" altLang="ko-KR" dirty="0"/>
-              <a:t>	- </a:t>
-            </a:r>
-            <a:r>
-              <a:rPr lang="ko-KR" altLang="en-US" dirty="0"/>
-              <a:t>투약 관련 기록 기능</a:t>
-            </a:r>
-            <a:endParaRPr lang="en-US" altLang="ko-KR" dirty="0"/>
+              <a:t>	- Blood glucose tracking</a:t>
+            </a:r>
           </a:p>
           <a:p>
             <a:r>
               <a:rPr lang="en-US" altLang="ko-KR" dirty="0"/>
-              <a:t>	- </a:t>
-            </a:r>
-            <a:r>
-              <a:rPr lang="ko-KR" altLang="en-US" dirty="0"/>
-              <a:t>식단 기록 기능</a:t>
-            </a:r>
-            <a:endParaRPr lang="en-US" altLang="ko-KR" dirty="0"/>
+              <a:t>	- Drug intake tracking</a:t>
+            </a:r>
+          </a:p>
+          <a:p>
+            <a:r>
+              <a:rPr lang="en-US" altLang="ko-KR" dirty="0"/>
+              <a:t>	- Diet tracking</a:t>
+            </a:r>
           </a:p>
           <a:p>
             <a:pPr marL="342900" indent="-342900">
               <a:buAutoNum type="arabicPeriod" startAt="3"/>
             </a:pPr>
             <a:r>
-              <a:rPr lang="ko-KR" altLang="en-US" dirty="0"/>
-              <a:t>심리치료 기능</a:t>
-            </a:r>
-            <a:endParaRPr lang="en-US" altLang="ko-KR" dirty="0"/>
-          </a:p>
-          <a:p>
-            <a:r>
               <a:rPr lang="en-US" altLang="ko-KR" dirty="0"/>
-              <a:t>	- </a:t>
-            </a:r>
-            <a:r>
-              <a:rPr lang="ko-KR" altLang="en-US" dirty="0"/>
-              <a:t>텍스트 기반 심리상태 기록 및 저장 기능</a:t>
-            </a:r>
-            <a:endParaRPr lang="en-US" altLang="ko-KR" dirty="0"/>
+              <a:t>CBT feature</a:t>
+            </a:r>
           </a:p>
           <a:p>
             <a:r>
               <a:rPr lang="en-US" altLang="ko-KR" dirty="0"/>
-              <a:t>	- </a:t>
-            </a:r>
-            <a:r>
-              <a:rPr lang="ko-KR" altLang="en-US" dirty="0"/>
-              <a:t>입력된 심리상태 기본적 분석 기능</a:t>
+              <a:t>	- Storing CBT diary</a:t>
+            </a:r>
+          </a:p>
+          <a:p>
+            <a:r>
+              <a:rPr lang="en-US" altLang="ko-KR" dirty="0"/>
+              <a:t>	- Analyzing </a:t>
+            </a:r>
+            <a:r>
+              <a:rPr lang="en-US" altLang="ko-KR"/>
+              <a:t>the diary</a:t>
             </a:r>
             <a:endParaRPr lang="en-US" altLang="ko-KR" dirty="0"/>
           </a:p>

</xml_diff>